<commit_message>
diagnostic simulations of v0.1.2 were performed
</commit_message>
<xml_diff>
--- a/docs/Description_model_development_testing.pptx
+++ b/docs/Description_model_development_testing.pptx
@@ -5,10 +5,10 @@
     <p:sldMasterId id="2147483660" r:id="rId1"/>
   </p:sldMasterIdLst>
   <p:notesMasterIdLst>
-    <p:notesMasterId r:id="rId50"/>
+    <p:notesMasterId r:id="rId61"/>
   </p:notesMasterIdLst>
   <p:handoutMasterIdLst>
-    <p:handoutMasterId r:id="rId51"/>
+    <p:handoutMasterId r:id="rId62"/>
   </p:handoutMasterIdLst>
   <p:sldIdLst>
     <p:sldId id="256" r:id="rId2"/>
@@ -58,7 +58,18 @@
     <p:sldId id="329" r:id="rId46"/>
     <p:sldId id="322" r:id="rId47"/>
     <p:sldId id="331" r:id="rId48"/>
-    <p:sldId id="315" r:id="rId49"/>
+    <p:sldId id="353" r:id="rId49"/>
+    <p:sldId id="332" r:id="rId50"/>
+    <p:sldId id="333" r:id="rId51"/>
+    <p:sldId id="334" r:id="rId52"/>
+    <p:sldId id="338" r:id="rId53"/>
+    <p:sldId id="341" r:id="rId54"/>
+    <p:sldId id="342" r:id="rId55"/>
+    <p:sldId id="348" r:id="rId56"/>
+    <p:sldId id="349" r:id="rId57"/>
+    <p:sldId id="350" r:id="rId58"/>
+    <p:sldId id="351" r:id="rId59"/>
+    <p:sldId id="315" r:id="rId60"/>
   </p:sldIdLst>
   <p:sldSz cx="9144000" cy="6858000" type="screen4x3"/>
   <p:notesSz cx="6858000" cy="9144000"/>
@@ -284,7 +295,7 @@
           <a:p>
             <a:fld id="{A94A04A9-86E8-4736-A88B-F0616A5CD8E2}" type="datetimeFigureOut">
               <a:rPr lang="ru-RU" smtClean="0"/>
-              <a:t>01-06-2020</a:t>
+              <a:t>07-06-2020</a:t>
             </a:fld>
             <a:endParaRPr lang="ru-RU"/>
           </a:p>
@@ -461,7 +472,7 @@
           <a:p>
             <a:fld id="{88DE18F7-3C35-4FFD-8CA4-BF84867EA133}" type="datetimeFigureOut">
               <a:rPr lang="ru-RU" smtClean="0"/>
-              <a:t>01-06-2020</a:t>
+              <a:t>07-06-2020</a:t>
             </a:fld>
             <a:endParaRPr lang="ru-RU"/>
           </a:p>
@@ -26116,7 +26127,7 @@
           <a:p>
             <a:r>
               <a:rPr lang="en-US" sz="2800" dirty="0"/>
-              <a:t>Commit date: 20.06.01</a:t>
+              <a:t>Commit date: 20.06.01/20.06.07</a:t>
             </a:r>
             <a:br>
               <a:rPr lang="en-US" sz="2800" dirty="0"/>
@@ -41918,10 +41929,39 @@
       </p:grpSpPr>
       <p:sp>
         <p:nvSpPr>
-          <p:cNvPr id="2" name="Slide Number Placeholder 1">
+          <p:cNvPr id="2" name="Title 1">
             <a:extLst>
               <a:ext uri="{FF2B5EF4-FFF2-40B4-BE49-F238E27FC236}">
-                <a16:creationId xmlns:a16="http://schemas.microsoft.com/office/drawing/2014/main" id="{AA6CEFC3-35E4-46AB-8178-6CE9EA81C1D9}"/>
+                <a16:creationId xmlns:a16="http://schemas.microsoft.com/office/drawing/2014/main" id="{A69FC8D2-D8CA-47FC-B906-45BE3F4BBA48}"/>
+              </a:ext>
+            </a:extLst>
+          </p:cNvPr>
+          <p:cNvSpPr>
+            <a:spLocks noGrp="1"/>
+          </p:cNvSpPr>
+          <p:nvPr>
+            <p:ph type="title"/>
+          </p:nvPr>
+        </p:nvSpPr>
+        <p:spPr/>
+        <p:txBody>
+          <a:bodyPr/>
+          <a:lstStyle/>
+          <a:p>
+            <a:r>
+              <a:rPr lang="en-US" dirty="0"/>
+              <a:t>Functions for diagnostic simulations</a:t>
+            </a:r>
+            <a:endParaRPr lang="ru-RU" dirty="0"/>
+          </a:p>
+        </p:txBody>
+      </p:sp>
+      <p:sp>
+        <p:nvSpPr>
+          <p:cNvPr id="3" name="Slide Number Placeholder 2">
+            <a:extLst>
+              <a:ext uri="{FF2B5EF4-FFF2-40B4-BE49-F238E27FC236}">
+                <a16:creationId xmlns:a16="http://schemas.microsoft.com/office/drawing/2014/main" id="{F224D7F0-E69E-4BA1-A890-C818C6C6AEFF}"/>
               </a:ext>
             </a:extLst>
           </p:cNvPr>
@@ -41946,10 +41986,905 @@
           </a:p>
         </p:txBody>
       </p:sp>
+      <p:sp>
+        <p:nvSpPr>
+          <p:cNvPr id="4" name="Text Placeholder 3">
+            <a:extLst>
+              <a:ext uri="{FF2B5EF4-FFF2-40B4-BE49-F238E27FC236}">
+                <a16:creationId xmlns:a16="http://schemas.microsoft.com/office/drawing/2014/main" id="{DBD4F0F0-BA6C-4FC2-92C1-22B34D92CAC8}"/>
+              </a:ext>
+            </a:extLst>
+          </p:cNvPr>
+          <p:cNvSpPr>
+            <a:spLocks noGrp="1"/>
+          </p:cNvSpPr>
+          <p:nvPr>
+            <p:ph type="body" sz="quarter" idx="13"/>
+          </p:nvPr>
+        </p:nvSpPr>
+        <p:spPr>
+          <a:xfrm>
+            <a:off x="412750" y="964733"/>
+            <a:ext cx="8323263" cy="5815465"/>
+          </a:xfrm>
+        </p:spPr>
+        <p:txBody>
+          <a:bodyPr>
+            <a:normAutofit fontScale="92500"/>
+          </a:bodyPr>
+          <a:lstStyle/>
+          <a:p>
+            <a:r>
+              <a:rPr lang="en-US" sz="1000" dirty="0" err="1"/>
+              <a:t>COV_num_sputum_ml</a:t>
+            </a:r>
+            <a:r>
+              <a:rPr lang="en-US" sz="1000" dirty="0"/>
+              <a:t> = </a:t>
+            </a:r>
+            <a:r>
+              <a:rPr lang="en-US" sz="1000" dirty="0" err="1"/>
+              <a:t>sputum_dilution_coef</a:t>
+            </a:r>
+            <a:r>
+              <a:rPr lang="en-US" sz="1000" dirty="0"/>
+              <a:t> * (COV + COV_RNA) * </a:t>
+            </a:r>
+            <a:r>
+              <a:rPr lang="en-US" sz="1000" dirty="0" err="1"/>
+              <a:t>Vol_alv</a:t>
+            </a:r>
+            <a:r>
+              <a:rPr lang="en-US" sz="1000" dirty="0"/>
+              <a:t> * </a:t>
+            </a:r>
+            <a:r>
+              <a:rPr lang="en-US" sz="1000" dirty="0" err="1"/>
+              <a:t>NA_pmole</a:t>
+            </a:r>
+            <a:r>
+              <a:rPr lang="en-US" sz="1000" dirty="0"/>
+              <a:t> / 1000; // 'number of virus copies in 1 mL of sputum' {units: item/mL}</a:t>
+            </a:r>
+          </a:p>
+          <a:p>
+            <a:r>
+              <a:rPr lang="en-US" sz="1000" dirty="0" err="1"/>
+              <a:t>PC_tot</a:t>
+            </a:r>
+            <a:r>
+              <a:rPr lang="en-US" sz="1000" dirty="0"/>
+              <a:t> = PC + </a:t>
+            </a:r>
+            <a:r>
+              <a:rPr lang="en-US" sz="1000" dirty="0" err="1"/>
+              <a:t>iPC</a:t>
+            </a:r>
+            <a:r>
+              <a:rPr lang="en-US" sz="1000" dirty="0"/>
+              <a:t> + </a:t>
+            </a:r>
+            <a:r>
+              <a:rPr lang="en-US" sz="1000" dirty="0" err="1"/>
+              <a:t>vPC</a:t>
+            </a:r>
+            <a:r>
+              <a:rPr lang="en-US" sz="1000" dirty="0"/>
+              <a:t>; // {units: </a:t>
+            </a:r>
+            <a:r>
+              <a:rPr lang="en-US" sz="1000" dirty="0" err="1"/>
+              <a:t>kcell</a:t>
+            </a:r>
+            <a:r>
+              <a:rPr lang="en-US" sz="1000" dirty="0"/>
+              <a:t>/L}               </a:t>
+            </a:r>
+            <a:r>
+              <a:rPr lang="en-US" sz="1000" dirty="0" err="1"/>
+              <a:t>PC_percent</a:t>
+            </a:r>
+            <a:r>
+              <a:rPr lang="en-US" sz="1000" dirty="0"/>
+              <a:t> = 100 * PC / </a:t>
+            </a:r>
+            <a:r>
+              <a:rPr lang="en-US" sz="1000" dirty="0" err="1"/>
+              <a:t>PC_tot</a:t>
+            </a:r>
+            <a:r>
+              <a:rPr lang="en-US" sz="1000" dirty="0"/>
+              <a:t>; // {units: UL}                </a:t>
+            </a:r>
+            <a:r>
+              <a:rPr lang="en-US" sz="1000" dirty="0" err="1"/>
+              <a:t>iPC_percent</a:t>
+            </a:r>
+            <a:r>
+              <a:rPr lang="en-US" sz="1000" dirty="0"/>
+              <a:t> = 100 * </a:t>
+            </a:r>
+            <a:r>
+              <a:rPr lang="en-US" sz="1000" dirty="0" err="1"/>
+              <a:t>iPC</a:t>
+            </a:r>
+            <a:r>
+              <a:rPr lang="en-US" sz="1000" dirty="0"/>
+              <a:t> / </a:t>
+            </a:r>
+            <a:r>
+              <a:rPr lang="en-US" sz="1000" dirty="0" err="1"/>
+              <a:t>PC_tot</a:t>
+            </a:r>
+            <a:r>
+              <a:rPr lang="en-US" sz="1000" dirty="0"/>
+              <a:t>; //   {units: UL}</a:t>
+            </a:r>
+          </a:p>
+          <a:p>
+            <a:r>
+              <a:rPr lang="en-US" sz="1000" dirty="0" err="1"/>
+              <a:t>vPC_percent</a:t>
+            </a:r>
+            <a:r>
+              <a:rPr lang="en-US" sz="1000" dirty="0"/>
+              <a:t> = 100 * </a:t>
+            </a:r>
+            <a:r>
+              <a:rPr lang="en-US" sz="1000" dirty="0" err="1"/>
+              <a:t>vPC</a:t>
+            </a:r>
+            <a:r>
+              <a:rPr lang="en-US" sz="1000" dirty="0"/>
+              <a:t> / </a:t>
+            </a:r>
+            <a:r>
+              <a:rPr lang="en-US" sz="1000" dirty="0" err="1"/>
+              <a:t>PC_tot</a:t>
+            </a:r>
+            <a:r>
+              <a:rPr lang="en-US" sz="1000" dirty="0"/>
+              <a:t>; // {units: UL}</a:t>
+            </a:r>
+          </a:p>
+          <a:p>
+            <a:r>
+              <a:rPr lang="en-US" sz="1000" dirty="0"/>
+              <a:t>ACE2_pc_per_cell = </a:t>
+            </a:r>
+            <a:r>
+              <a:rPr lang="en-US" sz="1000" dirty="0" err="1"/>
+              <a:t>NA_pmole</a:t>
+            </a:r>
+            <a:r>
+              <a:rPr lang="en-US" sz="1000" dirty="0"/>
+              <a:t> * ACE2_pc / PC / </a:t>
+            </a:r>
+            <a:r>
+              <a:rPr lang="en-US" sz="1000" dirty="0" err="1"/>
+              <a:t>Vol_alv</a:t>
+            </a:r>
+            <a:r>
+              <a:rPr lang="en-US" sz="1000" dirty="0"/>
+              <a:t> / </a:t>
+            </a:r>
+            <a:r>
+              <a:rPr lang="en-US" sz="1000" dirty="0" err="1"/>
+              <a:t>kcell_to_cell</a:t>
+            </a:r>
+            <a:r>
+              <a:rPr lang="en-US" sz="1000" dirty="0"/>
+              <a:t>; // @Record 'number of ACE2 per PC cell' {units: item/cell}</a:t>
+            </a:r>
+          </a:p>
+          <a:p>
+            <a:r>
+              <a:rPr lang="en-US" sz="1000" dirty="0"/>
+              <a:t>COV_ACE2_pc_per_cell = </a:t>
+            </a:r>
+            <a:r>
+              <a:rPr lang="en-US" sz="1000" dirty="0" err="1"/>
+              <a:t>NA_pmole</a:t>
+            </a:r>
+            <a:r>
+              <a:rPr lang="en-US" sz="1000" dirty="0"/>
+              <a:t> * COV_ACE2_pc / PC / </a:t>
+            </a:r>
+            <a:r>
+              <a:rPr lang="en-US" sz="1000" dirty="0" err="1"/>
+              <a:t>Vol_alv</a:t>
+            </a:r>
+            <a:r>
+              <a:rPr lang="en-US" sz="1000" dirty="0"/>
+              <a:t> / </a:t>
+            </a:r>
+            <a:r>
+              <a:rPr lang="en-US" sz="1000" dirty="0" err="1"/>
+              <a:t>kcell_to_cell</a:t>
+            </a:r>
+            <a:r>
+              <a:rPr lang="en-US" sz="1000" dirty="0"/>
+              <a:t>; // @Record 'number of COV_ACE2 per PC cell' {units: item/cell}</a:t>
+            </a:r>
+          </a:p>
+          <a:p>
+            <a:r>
+              <a:rPr lang="en-US" sz="1000" dirty="0"/>
+              <a:t>ACE2_pc_per_cell_tot = ACE2_pc_per_cell + COV_ACE2_pc_per_cell; // @Record 'total number of ACE2 molecules per PC cell' {units: item/cell}</a:t>
+            </a:r>
+          </a:p>
+          <a:p>
+            <a:r>
+              <a:rPr lang="en-US" sz="1000" dirty="0"/>
+              <a:t>ACE2_ipc_per_cell = </a:t>
+            </a:r>
+            <a:r>
+              <a:rPr lang="en-US" sz="1000" dirty="0" err="1"/>
+              <a:t>NA_pmole</a:t>
+            </a:r>
+            <a:r>
+              <a:rPr lang="en-US" sz="1000" dirty="0"/>
+              <a:t> * ACE2_ipc / </a:t>
+            </a:r>
+            <a:r>
+              <a:rPr lang="en-US" sz="1000" dirty="0" err="1"/>
+              <a:t>iPC</a:t>
+            </a:r>
+            <a:r>
+              <a:rPr lang="en-US" sz="1000" dirty="0"/>
+              <a:t> / </a:t>
+            </a:r>
+            <a:r>
+              <a:rPr lang="en-US" sz="1000" dirty="0" err="1"/>
+              <a:t>Vol_alv</a:t>
+            </a:r>
+            <a:r>
+              <a:rPr lang="en-US" sz="1000" dirty="0"/>
+              <a:t> / </a:t>
+            </a:r>
+            <a:r>
+              <a:rPr lang="en-US" sz="1000" dirty="0" err="1"/>
+              <a:t>kcell_to_cell</a:t>
+            </a:r>
+            <a:r>
+              <a:rPr lang="en-US" sz="1000" dirty="0"/>
+              <a:t>; // @Record 'number of ACE2 per </a:t>
+            </a:r>
+            <a:r>
+              <a:rPr lang="en-US" sz="1000" dirty="0" err="1"/>
+              <a:t>iPC</a:t>
+            </a:r>
+            <a:r>
+              <a:rPr lang="en-US" sz="1000" dirty="0"/>
+              <a:t> cell' {units: item/cell}</a:t>
+            </a:r>
+          </a:p>
+          <a:p>
+            <a:r>
+              <a:rPr lang="en-US" sz="1000" dirty="0"/>
+              <a:t>COV_ACE2_ipc_per_cell = </a:t>
+            </a:r>
+            <a:r>
+              <a:rPr lang="en-US" sz="1000" dirty="0" err="1"/>
+              <a:t>NA_pmole</a:t>
+            </a:r>
+            <a:r>
+              <a:rPr lang="en-US" sz="1000" dirty="0"/>
+              <a:t> * COV_ACE2_ipc / </a:t>
+            </a:r>
+            <a:r>
+              <a:rPr lang="en-US" sz="1000" dirty="0" err="1"/>
+              <a:t>iPC</a:t>
+            </a:r>
+            <a:r>
+              <a:rPr lang="en-US" sz="1000" dirty="0"/>
+              <a:t> / </a:t>
+            </a:r>
+            <a:r>
+              <a:rPr lang="en-US" sz="1000" dirty="0" err="1"/>
+              <a:t>Vol_alv</a:t>
+            </a:r>
+            <a:r>
+              <a:rPr lang="en-US" sz="1000" dirty="0"/>
+              <a:t> / </a:t>
+            </a:r>
+            <a:r>
+              <a:rPr lang="en-US" sz="1000" dirty="0" err="1"/>
+              <a:t>kcell_to_cell</a:t>
+            </a:r>
+            <a:r>
+              <a:rPr lang="en-US" sz="1000" dirty="0"/>
+              <a:t>; // @Record 'number of COV_ACE2 per </a:t>
+            </a:r>
+            <a:r>
+              <a:rPr lang="en-US" sz="1000" dirty="0" err="1"/>
+              <a:t>iPC</a:t>
+            </a:r>
+            <a:r>
+              <a:rPr lang="en-US" sz="1000" dirty="0"/>
+              <a:t> cell' {units: item/cell}</a:t>
+            </a:r>
+          </a:p>
+          <a:p>
+            <a:r>
+              <a:rPr lang="en-US" sz="1000" dirty="0"/>
+              <a:t>ACE2_ipc_per_cell_tot = ACE2_ipc_per_cell + COV_ACE2_ipc_per_cell; // @Record 'total number of ACE2 molecules per </a:t>
+            </a:r>
+            <a:r>
+              <a:rPr lang="en-US" sz="1000" dirty="0" err="1"/>
+              <a:t>iPC</a:t>
+            </a:r>
+            <a:r>
+              <a:rPr lang="en-US" sz="1000" dirty="0"/>
+              <a:t> cell' {units: item/cell}</a:t>
+            </a:r>
+          </a:p>
+          <a:p>
+            <a:r>
+              <a:rPr lang="en-US" sz="1000" dirty="0"/>
+              <a:t>ACE2_vpc_per_cell = </a:t>
+            </a:r>
+            <a:r>
+              <a:rPr lang="en-US" sz="1000" dirty="0" err="1"/>
+              <a:t>NA_pmole</a:t>
+            </a:r>
+            <a:r>
+              <a:rPr lang="en-US" sz="1000" dirty="0"/>
+              <a:t> * ACE2_vpc / </a:t>
+            </a:r>
+            <a:r>
+              <a:rPr lang="en-US" sz="1000" dirty="0" err="1"/>
+              <a:t>vPC</a:t>
+            </a:r>
+            <a:r>
+              <a:rPr lang="en-US" sz="1000" dirty="0"/>
+              <a:t> / </a:t>
+            </a:r>
+            <a:r>
+              <a:rPr lang="en-US" sz="1000" dirty="0" err="1"/>
+              <a:t>Vol_alv</a:t>
+            </a:r>
+            <a:r>
+              <a:rPr lang="en-US" sz="1000" dirty="0"/>
+              <a:t> / </a:t>
+            </a:r>
+            <a:r>
+              <a:rPr lang="en-US" sz="1000" dirty="0" err="1"/>
+              <a:t>kcell_to_cell</a:t>
+            </a:r>
+            <a:r>
+              <a:rPr lang="en-US" sz="1000" dirty="0"/>
+              <a:t>; // @Record 'number of ACE2 per </a:t>
+            </a:r>
+            <a:r>
+              <a:rPr lang="en-US" sz="1000" dirty="0" err="1"/>
+              <a:t>vPC</a:t>
+            </a:r>
+            <a:r>
+              <a:rPr lang="en-US" sz="1000" dirty="0"/>
+              <a:t> cell' {units: item/cell}</a:t>
+            </a:r>
+          </a:p>
+          <a:p>
+            <a:r>
+              <a:rPr lang="en-US" sz="1000" dirty="0"/>
+              <a:t>COV_ACE2_vpc_per_cell = </a:t>
+            </a:r>
+            <a:r>
+              <a:rPr lang="en-US" sz="1000" dirty="0" err="1"/>
+              <a:t>NA_pmole</a:t>
+            </a:r>
+            <a:r>
+              <a:rPr lang="en-US" sz="1000" dirty="0"/>
+              <a:t> * COV_ACE2_vpc / </a:t>
+            </a:r>
+            <a:r>
+              <a:rPr lang="en-US" sz="1000" dirty="0" err="1"/>
+              <a:t>vPC</a:t>
+            </a:r>
+            <a:r>
+              <a:rPr lang="en-US" sz="1000" dirty="0"/>
+              <a:t> / </a:t>
+            </a:r>
+            <a:r>
+              <a:rPr lang="en-US" sz="1000" dirty="0" err="1"/>
+              <a:t>Vol_alv</a:t>
+            </a:r>
+            <a:r>
+              <a:rPr lang="en-US" sz="1000" dirty="0"/>
+              <a:t> / </a:t>
+            </a:r>
+            <a:r>
+              <a:rPr lang="en-US" sz="1000" dirty="0" err="1"/>
+              <a:t>kcell_to_cell</a:t>
+            </a:r>
+            <a:r>
+              <a:rPr lang="en-US" sz="1000" dirty="0"/>
+              <a:t>; // @Record 'number of COV_ACE2 per </a:t>
+            </a:r>
+            <a:r>
+              <a:rPr lang="en-US" sz="1000" dirty="0" err="1"/>
+              <a:t>vPC</a:t>
+            </a:r>
+            <a:r>
+              <a:rPr lang="en-US" sz="1000" dirty="0"/>
+              <a:t> cell' {units: item/cell}</a:t>
+            </a:r>
+          </a:p>
+          <a:p>
+            <a:r>
+              <a:rPr lang="en-US" sz="1000" dirty="0"/>
+              <a:t>ACE2_vpc_per_cell_tot = ACE2_vpc_per_cell + COV_ACE2_vpc_per_cell; // @Record 'total number of ACE2 molecules per </a:t>
+            </a:r>
+            <a:r>
+              <a:rPr lang="en-US" sz="1000" dirty="0" err="1"/>
+              <a:t>vPC</a:t>
+            </a:r>
+            <a:r>
+              <a:rPr lang="en-US" sz="1000" dirty="0"/>
+              <a:t> cell' {units: item/cell}</a:t>
+            </a:r>
+          </a:p>
+          <a:p>
+            <a:r>
+              <a:rPr lang="en-US" sz="1000" dirty="0" err="1"/>
+              <a:t>COV_pc_per_cell_tot</a:t>
+            </a:r>
+            <a:r>
+              <a:rPr lang="en-US" sz="1000" dirty="0"/>
+              <a:t> = COV_ACE2_pc_per_cell; // @Record 'total number of COV genomes per PC cell' {units: item/cell}</a:t>
+            </a:r>
+          </a:p>
+          <a:p>
+            <a:r>
+              <a:rPr lang="en-US" sz="1000" dirty="0" err="1"/>
+              <a:t>COV_ipc_per_cell</a:t>
+            </a:r>
+            <a:r>
+              <a:rPr lang="en-US" sz="1000" dirty="0"/>
+              <a:t> = </a:t>
+            </a:r>
+            <a:r>
+              <a:rPr lang="en-US" sz="1000" dirty="0" err="1"/>
+              <a:t>NA_pmole</a:t>
+            </a:r>
+            <a:r>
+              <a:rPr lang="en-US" sz="1000" dirty="0"/>
+              <a:t> * </a:t>
+            </a:r>
+            <a:r>
+              <a:rPr lang="en-US" sz="1000" dirty="0" err="1"/>
+              <a:t>COV_ipc</a:t>
+            </a:r>
+            <a:r>
+              <a:rPr lang="en-US" sz="1000" dirty="0"/>
+              <a:t> / </a:t>
+            </a:r>
+            <a:r>
+              <a:rPr lang="en-US" sz="1000" dirty="0" err="1"/>
+              <a:t>iPC</a:t>
+            </a:r>
+            <a:r>
+              <a:rPr lang="en-US" sz="1000" dirty="0"/>
+              <a:t> / </a:t>
+            </a:r>
+            <a:r>
+              <a:rPr lang="en-US" sz="1000" dirty="0" err="1"/>
+              <a:t>Vol_alv</a:t>
+            </a:r>
+            <a:r>
+              <a:rPr lang="en-US" sz="1000" dirty="0"/>
+              <a:t> / </a:t>
+            </a:r>
+            <a:r>
+              <a:rPr lang="en-US" sz="1000" dirty="0" err="1"/>
+              <a:t>kcell_to_cell</a:t>
+            </a:r>
+            <a:r>
+              <a:rPr lang="en-US" sz="1000" dirty="0"/>
+              <a:t>; // @Record 'number of COV per </a:t>
+            </a:r>
+            <a:r>
+              <a:rPr lang="en-US" sz="1000" dirty="0" err="1"/>
+              <a:t>iPC</a:t>
+            </a:r>
+            <a:r>
+              <a:rPr lang="en-US" sz="1000" dirty="0"/>
+              <a:t> cell' {units: item/cell}</a:t>
+            </a:r>
+          </a:p>
+          <a:p>
+            <a:r>
+              <a:rPr lang="en-US" sz="1000" dirty="0" err="1"/>
+              <a:t>COV_ipc_per_cell_tot</a:t>
+            </a:r>
+            <a:r>
+              <a:rPr lang="en-US" sz="1000" dirty="0"/>
+              <a:t> = COV_ACE2_ipc_per_cell + </a:t>
+            </a:r>
+            <a:r>
+              <a:rPr lang="en-US" sz="1000" dirty="0" err="1"/>
+              <a:t>COV_ipc_per_cell</a:t>
+            </a:r>
+            <a:r>
+              <a:rPr lang="en-US" sz="1000" dirty="0"/>
+              <a:t>; // @Record 'total number of COV genomes per </a:t>
+            </a:r>
+            <a:r>
+              <a:rPr lang="en-US" sz="1000" dirty="0" err="1"/>
+              <a:t>iPC</a:t>
+            </a:r>
+            <a:r>
+              <a:rPr lang="en-US" sz="1000" dirty="0"/>
+              <a:t> cell' {units: item/cell}</a:t>
+            </a:r>
+          </a:p>
+          <a:p>
+            <a:r>
+              <a:rPr lang="en-US" sz="1000" dirty="0" err="1"/>
+              <a:t>COV_vpc_per_cell</a:t>
+            </a:r>
+            <a:r>
+              <a:rPr lang="en-US" sz="1000" dirty="0"/>
+              <a:t> = </a:t>
+            </a:r>
+            <a:r>
+              <a:rPr lang="en-US" sz="1000" dirty="0" err="1"/>
+              <a:t>NA_pmole</a:t>
+            </a:r>
+            <a:r>
+              <a:rPr lang="en-US" sz="1000" dirty="0"/>
+              <a:t> * </a:t>
+            </a:r>
+            <a:r>
+              <a:rPr lang="en-US" sz="1000" dirty="0" err="1"/>
+              <a:t>COV_vpc</a:t>
+            </a:r>
+            <a:r>
+              <a:rPr lang="en-US" sz="1000" dirty="0"/>
+              <a:t> / </a:t>
+            </a:r>
+            <a:r>
+              <a:rPr lang="en-US" sz="1000" dirty="0" err="1"/>
+              <a:t>vPC</a:t>
+            </a:r>
+            <a:r>
+              <a:rPr lang="en-US" sz="1000" dirty="0"/>
+              <a:t> / </a:t>
+            </a:r>
+            <a:r>
+              <a:rPr lang="en-US" sz="1000" dirty="0" err="1"/>
+              <a:t>Vol_alv</a:t>
+            </a:r>
+            <a:r>
+              <a:rPr lang="en-US" sz="1000" dirty="0"/>
+              <a:t> / </a:t>
+            </a:r>
+            <a:r>
+              <a:rPr lang="en-US" sz="1000" dirty="0" err="1"/>
+              <a:t>kcell_to_cell</a:t>
+            </a:r>
+            <a:r>
+              <a:rPr lang="en-US" sz="1000" dirty="0"/>
+              <a:t>; // @Record 'number of COV per </a:t>
+            </a:r>
+            <a:r>
+              <a:rPr lang="en-US" sz="1000" dirty="0" err="1"/>
+              <a:t>vPC</a:t>
+            </a:r>
+            <a:r>
+              <a:rPr lang="en-US" sz="1000" dirty="0"/>
+              <a:t> cell' {units: item/cell}</a:t>
+            </a:r>
+          </a:p>
+          <a:p>
+            <a:r>
+              <a:rPr lang="en-US" sz="1000" dirty="0" err="1"/>
+              <a:t>COV_RNA_vpc_per_cell</a:t>
+            </a:r>
+            <a:r>
+              <a:rPr lang="en-US" sz="1000" dirty="0"/>
+              <a:t> = </a:t>
+            </a:r>
+            <a:r>
+              <a:rPr lang="en-US" sz="1000" dirty="0" err="1"/>
+              <a:t>NA_pmole</a:t>
+            </a:r>
+            <a:r>
+              <a:rPr lang="en-US" sz="1000" dirty="0"/>
+              <a:t> * </a:t>
+            </a:r>
+            <a:r>
+              <a:rPr lang="en-US" sz="1000" dirty="0" err="1"/>
+              <a:t>COV_RNA_vpc</a:t>
+            </a:r>
+            <a:r>
+              <a:rPr lang="en-US" sz="1000" dirty="0"/>
+              <a:t> / </a:t>
+            </a:r>
+            <a:r>
+              <a:rPr lang="en-US" sz="1000" dirty="0" err="1"/>
+              <a:t>vPC</a:t>
+            </a:r>
+            <a:r>
+              <a:rPr lang="en-US" sz="1000" dirty="0"/>
+              <a:t> / </a:t>
+            </a:r>
+            <a:r>
+              <a:rPr lang="en-US" sz="1000" dirty="0" err="1"/>
+              <a:t>Vol_alv</a:t>
+            </a:r>
+            <a:r>
+              <a:rPr lang="en-US" sz="1000" dirty="0"/>
+              <a:t> / </a:t>
+            </a:r>
+            <a:r>
+              <a:rPr lang="en-US" sz="1000" dirty="0" err="1"/>
+              <a:t>kcell_to_cell</a:t>
+            </a:r>
+            <a:r>
+              <a:rPr lang="en-US" sz="1000" dirty="0"/>
+              <a:t>; // @Record 'number of COV_RNA per </a:t>
+            </a:r>
+            <a:r>
+              <a:rPr lang="en-US" sz="1000" dirty="0" err="1"/>
+              <a:t>vPC</a:t>
+            </a:r>
+            <a:r>
+              <a:rPr lang="en-US" sz="1000" dirty="0"/>
+              <a:t> cell' {units: item/cell}</a:t>
+            </a:r>
+          </a:p>
+          <a:p>
+            <a:r>
+              <a:rPr lang="en-US" sz="1000" dirty="0" err="1"/>
+              <a:t>COVass_vpc_per_cell</a:t>
+            </a:r>
+            <a:r>
+              <a:rPr lang="en-US" sz="1000" dirty="0"/>
+              <a:t> = </a:t>
+            </a:r>
+            <a:r>
+              <a:rPr lang="en-US" sz="1000" dirty="0" err="1"/>
+              <a:t>NA_pmole</a:t>
+            </a:r>
+            <a:r>
+              <a:rPr lang="en-US" sz="1000" dirty="0"/>
+              <a:t> * </a:t>
+            </a:r>
+            <a:r>
+              <a:rPr lang="en-US" sz="1000" dirty="0" err="1"/>
+              <a:t>COVass_vpc</a:t>
+            </a:r>
+            <a:r>
+              <a:rPr lang="en-US" sz="1000" dirty="0"/>
+              <a:t> / </a:t>
+            </a:r>
+            <a:r>
+              <a:rPr lang="en-US" sz="1000" dirty="0" err="1"/>
+              <a:t>vPC</a:t>
+            </a:r>
+            <a:r>
+              <a:rPr lang="en-US" sz="1000" dirty="0"/>
+              <a:t> / </a:t>
+            </a:r>
+            <a:r>
+              <a:rPr lang="en-US" sz="1000" dirty="0" err="1"/>
+              <a:t>Vol_alv</a:t>
+            </a:r>
+            <a:r>
+              <a:rPr lang="en-US" sz="1000" dirty="0"/>
+              <a:t> / </a:t>
+            </a:r>
+            <a:r>
+              <a:rPr lang="en-US" sz="1000" dirty="0" err="1"/>
+              <a:t>kcell_to_cell</a:t>
+            </a:r>
+            <a:r>
+              <a:rPr lang="en-US" sz="1000" dirty="0"/>
+              <a:t>; // @Record 'number of </a:t>
+            </a:r>
+            <a:r>
+              <a:rPr lang="en-US" sz="1000" dirty="0" err="1"/>
+              <a:t>COVass</a:t>
+            </a:r>
+            <a:r>
+              <a:rPr lang="en-US" sz="1000" dirty="0"/>
+              <a:t> per </a:t>
+            </a:r>
+            <a:r>
+              <a:rPr lang="en-US" sz="1000" dirty="0" err="1"/>
+              <a:t>vPC</a:t>
+            </a:r>
+            <a:r>
+              <a:rPr lang="en-US" sz="1000" dirty="0"/>
+              <a:t> cell' {units: item/cell}</a:t>
+            </a:r>
+          </a:p>
+          <a:p>
+            <a:r>
+              <a:rPr lang="en-US" sz="1000" dirty="0" err="1"/>
+              <a:t>COV_vpc_per_cell_tot</a:t>
+            </a:r>
+            <a:r>
+              <a:rPr lang="en-US" sz="1000" dirty="0"/>
+              <a:t> = COV_ACE2_vpc_per_cell + </a:t>
+            </a:r>
+            <a:r>
+              <a:rPr lang="en-US" sz="1000" dirty="0" err="1"/>
+              <a:t>COV_vpc_per_cell</a:t>
+            </a:r>
+            <a:r>
+              <a:rPr lang="en-US" sz="1000" dirty="0"/>
+              <a:t> + </a:t>
+            </a:r>
+            <a:r>
+              <a:rPr lang="en-US" sz="1000" dirty="0" err="1"/>
+              <a:t>COV_RNA_vpc_per_cell</a:t>
+            </a:r>
+            <a:r>
+              <a:rPr lang="en-US" sz="1000" dirty="0"/>
+              <a:t> + </a:t>
+            </a:r>
+            <a:r>
+              <a:rPr lang="en-US" sz="1000" dirty="0" err="1"/>
+              <a:t>COVass_vpc_per_cell</a:t>
+            </a:r>
+            <a:r>
+              <a:rPr lang="en-US" sz="1000" dirty="0"/>
+              <a:t>; // @Record 'total number of COV genomes per </a:t>
+            </a:r>
+            <a:r>
+              <a:rPr lang="en-US" sz="1000" dirty="0" err="1"/>
+              <a:t>vPC</a:t>
+            </a:r>
+            <a:r>
+              <a:rPr lang="en-US" sz="1000" dirty="0"/>
+              <a:t> cell' {units: item/cell}</a:t>
+            </a:r>
+          </a:p>
+          <a:p>
+            <a:r>
+              <a:rPr lang="en-US" sz="1000" dirty="0" err="1"/>
+              <a:t>COV_sgRNA_perc</a:t>
+            </a:r>
+            <a:r>
+              <a:rPr lang="en-US" sz="1000" dirty="0"/>
+              <a:t> = 100 * COV_RNA / (COV + COV_RNA); // @Record 'percent of actively transcribed </a:t>
+            </a:r>
+            <a:r>
+              <a:rPr lang="en-US" sz="1000" dirty="0" err="1"/>
+              <a:t>subgenomic</a:t>
+            </a:r>
+            <a:r>
+              <a:rPr lang="en-US" sz="1000" dirty="0"/>
+              <a:t> RNA of total (packed + unpacked) RNA in sputum samples taken from the patients' {units: UL</a:t>
+            </a:r>
+          </a:p>
+        </p:txBody>
+      </p:sp>
     </p:spTree>
     <p:extLst>
       <p:ext uri="{BB962C8B-B14F-4D97-AF65-F5344CB8AC3E}">
-        <p14:creationId xmlns:p14="http://schemas.microsoft.com/office/powerpoint/2010/main" val="3869420338"/>
+        <p14:creationId xmlns:p14="http://schemas.microsoft.com/office/powerpoint/2010/main" val="1077053929"/>
+      </p:ext>
+    </p:extLst>
+  </p:cSld>
+  <p:clrMapOvr>
+    <a:masterClrMapping/>
+  </p:clrMapOvr>
+</p:sld>
+</file>
+
+<file path=ppt/slides/slide49.xml><?xml version="1.0" encoding="utf-8"?>
+<p:sld xmlns:a="http://schemas.openxmlformats.org/drawingml/2006/main" xmlns:r="http://schemas.openxmlformats.org/officeDocument/2006/relationships" xmlns:p="http://schemas.openxmlformats.org/presentationml/2006/main">
+  <p:cSld>
+    <p:spTree>
+      <p:nvGrpSpPr>
+        <p:cNvPr id="1" name=""/>
+        <p:cNvGrpSpPr/>
+        <p:nvPr/>
+      </p:nvGrpSpPr>
+      <p:grpSpPr>
+        <a:xfrm>
+          <a:off x="0" y="0"/>
+          <a:ext cx="0" cy="0"/>
+          <a:chOff x="0" y="0"/>
+          <a:chExt cx="0" cy="0"/>
+        </a:xfrm>
+      </p:grpSpPr>
+      <p:sp>
+        <p:nvSpPr>
+          <p:cNvPr id="2" name="Title 1">
+            <a:extLst>
+              <a:ext uri="{FF2B5EF4-FFF2-40B4-BE49-F238E27FC236}">
+                <a16:creationId xmlns:a16="http://schemas.microsoft.com/office/drawing/2014/main" id="{2D1BF381-66B2-43FA-897A-44DEB0055EA3}"/>
+              </a:ext>
+            </a:extLst>
+          </p:cNvPr>
+          <p:cNvSpPr>
+            <a:spLocks noGrp="1"/>
+          </p:cNvSpPr>
+          <p:nvPr>
+            <p:ph type="title"/>
+          </p:nvPr>
+        </p:nvSpPr>
+        <p:spPr/>
+        <p:txBody>
+          <a:bodyPr/>
+          <a:lstStyle/>
+          <a:p>
+            <a:r>
+              <a:rPr lang="en-US" dirty="0"/>
+              <a:t>Cells and virus in bulk phase</a:t>
+            </a:r>
+            <a:endParaRPr lang="ru-RU" dirty="0"/>
+          </a:p>
+        </p:txBody>
+      </p:sp>
+      <p:sp>
+        <p:nvSpPr>
+          <p:cNvPr id="3" name="Text Placeholder 2">
+            <a:extLst>
+              <a:ext uri="{FF2B5EF4-FFF2-40B4-BE49-F238E27FC236}">
+                <a16:creationId xmlns:a16="http://schemas.microsoft.com/office/drawing/2014/main" id="{62FEB3F1-229C-4F42-9E5D-DAF020037F26}"/>
+              </a:ext>
+            </a:extLst>
+          </p:cNvPr>
+          <p:cNvSpPr>
+            <a:spLocks noGrp="1"/>
+          </p:cNvSpPr>
+          <p:nvPr>
+            <p:ph type="body" idx="1"/>
+          </p:nvPr>
+        </p:nvSpPr>
+        <p:spPr/>
+        <p:txBody>
+          <a:bodyPr/>
+          <a:lstStyle/>
+          <a:p>
+            <a:r>
+              <a:rPr lang="en-US" dirty="0"/>
+              <a:t>Diagnostic simulations of key model species and characteristics</a:t>
+            </a:r>
+            <a:endParaRPr lang="ru-RU" dirty="0"/>
+          </a:p>
+        </p:txBody>
+      </p:sp>
+      <p:sp>
+        <p:nvSpPr>
+          <p:cNvPr id="4" name="Slide Number Placeholder 3">
+            <a:extLst>
+              <a:ext uri="{FF2B5EF4-FFF2-40B4-BE49-F238E27FC236}">
+                <a16:creationId xmlns:a16="http://schemas.microsoft.com/office/drawing/2014/main" id="{60214CFF-4ECD-4E4C-9AC6-D8758930DD45}"/>
+              </a:ext>
+            </a:extLst>
+          </p:cNvPr>
+          <p:cNvSpPr>
+            <a:spLocks noGrp="1"/>
+          </p:cNvSpPr>
+          <p:nvPr>
+            <p:ph type="sldNum" sz="quarter" idx="12"/>
+          </p:nvPr>
+        </p:nvSpPr>
+        <p:spPr/>
+        <p:txBody>
+          <a:bodyPr/>
+          <a:lstStyle/>
+          <a:p>
+            <a:fld id="{8D0E1ED9-1B5C-4060-9004-48CB920062D4}" type="slidenum">
+              <a:rPr lang="ru-RU" smtClean="0"/>
+              <a:pPr/>
+              <a:t>49</a:t>
+            </a:fld>
+            <a:endParaRPr lang="ru-RU"/>
+          </a:p>
+        </p:txBody>
+      </p:sp>
+    </p:spTree>
+    <p:extLst>
+      <p:ext uri="{BB962C8B-B14F-4D97-AF65-F5344CB8AC3E}">
+        <p14:creationId xmlns:p14="http://schemas.microsoft.com/office/powerpoint/2010/main" val="3215901554"/>
       </p:ext>
     </p:extLst>
   </p:cSld>
@@ -42080,6 +43015,2884 @@
     <p:extLst>
       <p:ext uri="{BB962C8B-B14F-4D97-AF65-F5344CB8AC3E}">
         <p14:creationId xmlns:p14="http://schemas.microsoft.com/office/powerpoint/2010/main" val="119349494"/>
+      </p:ext>
+    </p:extLst>
+  </p:cSld>
+  <p:clrMapOvr>
+    <a:masterClrMapping/>
+  </p:clrMapOvr>
+</p:sld>
+</file>
+
+<file path=ppt/slides/slide50.xml><?xml version="1.0" encoding="utf-8"?>
+<p:sld xmlns:a="http://schemas.openxmlformats.org/drawingml/2006/main" xmlns:r="http://schemas.openxmlformats.org/officeDocument/2006/relationships" xmlns:p="http://schemas.openxmlformats.org/presentationml/2006/main">
+  <p:cSld>
+    <p:spTree>
+      <p:nvGrpSpPr>
+        <p:cNvPr id="1" name=""/>
+        <p:cNvGrpSpPr/>
+        <p:nvPr/>
+      </p:nvGrpSpPr>
+      <p:grpSpPr>
+        <a:xfrm>
+          <a:off x="0" y="0"/>
+          <a:ext cx="0" cy="0"/>
+          <a:chOff x="0" y="0"/>
+          <a:chExt cx="0" cy="0"/>
+        </a:xfrm>
+      </p:grpSpPr>
+      <p:sp>
+        <p:nvSpPr>
+          <p:cNvPr id="2" name="Заголовок 1"/>
+          <p:cNvSpPr>
+            <a:spLocks noGrp="1"/>
+          </p:cNvSpPr>
+          <p:nvPr>
+            <p:ph type="title"/>
+          </p:nvPr>
+        </p:nvSpPr>
+        <p:spPr/>
+        <p:txBody>
+          <a:bodyPr/>
+          <a:lstStyle/>
+          <a:p>
+            <a:r>
+              <a:rPr lang="en-US" dirty="0"/>
+              <a:t>Simulations: COV in surfactant</a:t>
+            </a:r>
+            <a:endParaRPr lang="ru-RU" dirty="0"/>
+          </a:p>
+        </p:txBody>
+      </p:sp>
+      <p:sp>
+        <p:nvSpPr>
+          <p:cNvPr id="3" name="Номер слайда 2"/>
+          <p:cNvSpPr>
+            <a:spLocks noGrp="1"/>
+          </p:cNvSpPr>
+          <p:nvPr>
+            <p:ph type="sldNum" sz="quarter" idx="12"/>
+          </p:nvPr>
+        </p:nvSpPr>
+        <p:spPr/>
+        <p:txBody>
+          <a:bodyPr/>
+          <a:lstStyle/>
+          <a:p>
+            <a:fld id="{8D0E1ED9-1B5C-4060-9004-48CB920062D4}" type="slidenum">
+              <a:rPr lang="ru-RU" smtClean="0"/>
+              <a:pPr/>
+              <a:t>50</a:t>
+            </a:fld>
+            <a:endParaRPr lang="ru-RU"/>
+          </a:p>
+        </p:txBody>
+      </p:sp>
+      <p:pic>
+        <p:nvPicPr>
+          <p:cNvPr id="6" name="Picture 5">
+            <a:extLst>
+              <a:ext uri="{FF2B5EF4-FFF2-40B4-BE49-F238E27FC236}">
+                <a16:creationId xmlns:a16="http://schemas.microsoft.com/office/drawing/2014/main" id="{458412D6-0A5C-4C6F-9CCF-8629A9FE2637}"/>
+              </a:ext>
+            </a:extLst>
+          </p:cNvPr>
+          <p:cNvPicPr>
+            <a:picLocks noChangeAspect="1"/>
+          </p:cNvPicPr>
+          <p:nvPr/>
+        </p:nvPicPr>
+        <p:blipFill>
+          <a:blip r:embed="rId2">
+            <a:extLst>
+              <a:ext uri="{28A0092B-C50C-407E-A947-70E740481C1C}">
+                <a14:useLocalDpi xmlns:a14="http://schemas.microsoft.com/office/drawing/2010/main" val="0"/>
+              </a:ext>
+            </a:extLst>
+          </a:blip>
+          <a:stretch>
+            <a:fillRect/>
+          </a:stretch>
+        </p:blipFill>
+        <p:spPr>
+          <a:xfrm>
+            <a:off x="501327" y="727569"/>
+            <a:ext cx="6069952" cy="2886928"/>
+          </a:xfrm>
+          <a:prstGeom prst="rect">
+            <a:avLst/>
+          </a:prstGeom>
+        </p:spPr>
+      </p:pic>
+      <p:pic>
+        <p:nvPicPr>
+          <p:cNvPr id="9" name="Picture 8">
+            <a:extLst>
+              <a:ext uri="{FF2B5EF4-FFF2-40B4-BE49-F238E27FC236}">
+                <a16:creationId xmlns:a16="http://schemas.microsoft.com/office/drawing/2014/main" id="{4E44915C-EA37-4A62-8ACF-3AD1A54CA44A}"/>
+              </a:ext>
+            </a:extLst>
+          </p:cNvPr>
+          <p:cNvPicPr>
+            <a:picLocks noChangeAspect="1"/>
+          </p:cNvPicPr>
+          <p:nvPr/>
+        </p:nvPicPr>
+        <p:blipFill>
+          <a:blip r:embed="rId3">
+            <a:extLst>
+              <a:ext uri="{28A0092B-C50C-407E-A947-70E740481C1C}">
+                <a14:useLocalDpi xmlns:a14="http://schemas.microsoft.com/office/drawing/2010/main" val="0"/>
+              </a:ext>
+            </a:extLst>
+          </a:blip>
+          <a:stretch>
+            <a:fillRect/>
+          </a:stretch>
+        </p:blipFill>
+        <p:spPr>
+          <a:xfrm>
+            <a:off x="501327" y="3614497"/>
+            <a:ext cx="6069952" cy="2886928"/>
+          </a:xfrm>
+          <a:prstGeom prst="rect">
+            <a:avLst/>
+          </a:prstGeom>
+        </p:spPr>
+      </p:pic>
+      <p:sp>
+        <p:nvSpPr>
+          <p:cNvPr id="15" name="TextBox 14">
+            <a:extLst>
+              <a:ext uri="{FF2B5EF4-FFF2-40B4-BE49-F238E27FC236}">
+                <a16:creationId xmlns:a16="http://schemas.microsoft.com/office/drawing/2014/main" id="{E36805B7-BD89-4712-BF44-A5736A6534E7}"/>
+              </a:ext>
+            </a:extLst>
+          </p:cNvPr>
+          <p:cNvSpPr txBox="1"/>
+          <p:nvPr/>
+        </p:nvSpPr>
+        <p:spPr>
+          <a:xfrm>
+            <a:off x="1226446" y="1001482"/>
+            <a:ext cx="2533790" cy="1169551"/>
+          </a:xfrm>
+          <a:prstGeom prst="rect">
+            <a:avLst/>
+          </a:prstGeom>
+          <a:noFill/>
+        </p:spPr>
+        <p:txBody>
+          <a:bodyPr wrap="square" rtlCol="0">
+            <a:spAutoFit/>
+          </a:bodyPr>
+          <a:lstStyle/>
+          <a:p>
+            <a:r>
+              <a:rPr lang="en-US" sz="1400" b="1" dirty="0"/>
+              <a:t>Virus initial concentration: </a:t>
+            </a:r>
+          </a:p>
+          <a:p>
+            <a:r>
+              <a:rPr lang="en-US" sz="1400" b="1" dirty="0"/>
+              <a:t>843 copies/mL</a:t>
+            </a:r>
+          </a:p>
+          <a:p>
+            <a:r>
+              <a:rPr lang="en-US" sz="1400" b="1" dirty="0">
+                <a:solidFill>
+                  <a:srgbClr val="0000FF"/>
+                </a:solidFill>
+              </a:rPr>
+              <a:t>1685 copies/mL</a:t>
+            </a:r>
+          </a:p>
+          <a:p>
+            <a:r>
+              <a:rPr lang="en-US" sz="1400" b="1" dirty="0">
+                <a:solidFill>
+                  <a:srgbClr val="FF0000"/>
+                </a:solidFill>
+              </a:rPr>
+              <a:t>3370 copies/mL</a:t>
+            </a:r>
+          </a:p>
+          <a:p>
+            <a:r>
+              <a:rPr lang="en-US" sz="1400" b="1" dirty="0">
+                <a:solidFill>
+                  <a:srgbClr val="00B050"/>
+                </a:solidFill>
+              </a:rPr>
+              <a:t>6740 copies/mL</a:t>
+            </a:r>
+            <a:endParaRPr lang="ru-RU" sz="1400" b="1" dirty="0">
+              <a:solidFill>
+                <a:srgbClr val="00B050"/>
+              </a:solidFill>
+            </a:endParaRPr>
+          </a:p>
+        </p:txBody>
+      </p:sp>
+      <p:sp>
+        <p:nvSpPr>
+          <p:cNvPr id="16" name="TextBox 15">
+            <a:extLst>
+              <a:ext uri="{FF2B5EF4-FFF2-40B4-BE49-F238E27FC236}">
+                <a16:creationId xmlns:a16="http://schemas.microsoft.com/office/drawing/2014/main" id="{DFF4B73F-A595-476B-B62C-64CF79E08D6B}"/>
+              </a:ext>
+            </a:extLst>
+          </p:cNvPr>
+          <p:cNvSpPr txBox="1"/>
+          <p:nvPr/>
+        </p:nvSpPr>
+        <p:spPr>
+          <a:xfrm>
+            <a:off x="2579386" y="4047560"/>
+            <a:ext cx="2533790" cy="1169551"/>
+          </a:xfrm>
+          <a:prstGeom prst="rect">
+            <a:avLst/>
+          </a:prstGeom>
+          <a:noFill/>
+        </p:spPr>
+        <p:txBody>
+          <a:bodyPr wrap="square" rtlCol="0">
+            <a:spAutoFit/>
+          </a:bodyPr>
+          <a:lstStyle/>
+          <a:p>
+            <a:r>
+              <a:rPr lang="en-US" sz="1400" b="1" dirty="0"/>
+              <a:t>Virus initial concentration: </a:t>
+            </a:r>
+          </a:p>
+          <a:p>
+            <a:r>
+              <a:rPr lang="en-US" sz="1400" b="1" dirty="0"/>
+              <a:t>843 copies/mL</a:t>
+            </a:r>
+          </a:p>
+          <a:p>
+            <a:r>
+              <a:rPr lang="en-US" sz="1400" b="1" dirty="0">
+                <a:solidFill>
+                  <a:srgbClr val="0000FF"/>
+                </a:solidFill>
+              </a:rPr>
+              <a:t>1685 copies/mL</a:t>
+            </a:r>
+          </a:p>
+          <a:p>
+            <a:r>
+              <a:rPr lang="en-US" sz="1400" b="1" dirty="0">
+                <a:solidFill>
+                  <a:srgbClr val="FF0000"/>
+                </a:solidFill>
+              </a:rPr>
+              <a:t>3370 copies/mL</a:t>
+            </a:r>
+          </a:p>
+          <a:p>
+            <a:r>
+              <a:rPr lang="en-US" sz="1400" b="1" dirty="0">
+                <a:solidFill>
+                  <a:srgbClr val="00B050"/>
+                </a:solidFill>
+              </a:rPr>
+              <a:t>6740 copies/mL</a:t>
+            </a:r>
+            <a:endParaRPr lang="ru-RU" sz="1400" b="1" dirty="0">
+              <a:solidFill>
+                <a:srgbClr val="00B050"/>
+              </a:solidFill>
+            </a:endParaRPr>
+          </a:p>
+        </p:txBody>
+      </p:sp>
+      <p:sp>
+        <p:nvSpPr>
+          <p:cNvPr id="11" name="TextBox 10">
+            <a:extLst>
+              <a:ext uri="{FF2B5EF4-FFF2-40B4-BE49-F238E27FC236}">
+                <a16:creationId xmlns:a16="http://schemas.microsoft.com/office/drawing/2014/main" id="{16B93C97-F383-4AD2-8A32-71E5BA968487}"/>
+              </a:ext>
+            </a:extLst>
+          </p:cNvPr>
+          <p:cNvSpPr txBox="1"/>
+          <p:nvPr/>
+        </p:nvSpPr>
+        <p:spPr>
+          <a:xfrm>
+            <a:off x="6660088" y="1001482"/>
+            <a:ext cx="2381276" cy="2862322"/>
+          </a:xfrm>
+          <a:prstGeom prst="rect">
+            <a:avLst/>
+          </a:prstGeom>
+          <a:noFill/>
+        </p:spPr>
+        <p:txBody>
+          <a:bodyPr wrap="square" rtlCol="0">
+            <a:spAutoFit/>
+          </a:bodyPr>
+          <a:lstStyle/>
+          <a:p>
+            <a:pPr marL="285750" indent="-285750">
+              <a:buFont typeface="Arial" panose="020B0604020202020204" pitchFamily="34" charset="0"/>
+              <a:buChar char="•"/>
+            </a:pPr>
+            <a:r>
+              <a:rPr lang="en-US" dirty="0"/>
+              <a:t>Initial COV is  very rapidly consumed from the bulk phase: 1e-5 day = 0.86 sec</a:t>
+            </a:r>
+          </a:p>
+          <a:p>
+            <a:pPr marL="285750" indent="-285750">
+              <a:buFont typeface="Arial" panose="020B0604020202020204" pitchFamily="34" charset="0"/>
+              <a:buChar char="•"/>
+            </a:pPr>
+            <a:r>
+              <a:rPr lang="en-US" dirty="0"/>
+              <a:t>It took about 5 days to start to observe increase in bulk phase COV </a:t>
+            </a:r>
+          </a:p>
+          <a:p>
+            <a:pPr marL="285750" indent="-285750">
+              <a:buFont typeface="Arial" panose="020B0604020202020204" pitchFamily="34" charset="0"/>
+              <a:buChar char="•"/>
+            </a:pPr>
+            <a:endParaRPr lang="ru-RU" dirty="0"/>
+          </a:p>
+        </p:txBody>
+      </p:sp>
+    </p:spTree>
+    <p:extLst>
+      <p:ext uri="{BB962C8B-B14F-4D97-AF65-F5344CB8AC3E}">
+        <p14:creationId xmlns:p14="http://schemas.microsoft.com/office/powerpoint/2010/main" val="1039959239"/>
+      </p:ext>
+    </p:extLst>
+  </p:cSld>
+  <p:clrMapOvr>
+    <a:masterClrMapping/>
+  </p:clrMapOvr>
+</p:sld>
+</file>
+
+<file path=ppt/slides/slide51.xml><?xml version="1.0" encoding="utf-8"?>
+<p:sld xmlns:a="http://schemas.openxmlformats.org/drawingml/2006/main" xmlns:r="http://schemas.openxmlformats.org/officeDocument/2006/relationships" xmlns:p="http://schemas.openxmlformats.org/presentationml/2006/main">
+  <p:cSld>
+    <p:spTree>
+      <p:nvGrpSpPr>
+        <p:cNvPr id="1" name=""/>
+        <p:cNvGrpSpPr/>
+        <p:nvPr/>
+      </p:nvGrpSpPr>
+      <p:grpSpPr>
+        <a:xfrm>
+          <a:off x="0" y="0"/>
+          <a:ext cx="0" cy="0"/>
+          <a:chOff x="0" y="0"/>
+          <a:chExt cx="0" cy="0"/>
+        </a:xfrm>
+      </p:grpSpPr>
+      <p:sp>
+        <p:nvSpPr>
+          <p:cNvPr id="2" name="Заголовок 1"/>
+          <p:cNvSpPr>
+            <a:spLocks noGrp="1"/>
+          </p:cNvSpPr>
+          <p:nvPr>
+            <p:ph type="title"/>
+          </p:nvPr>
+        </p:nvSpPr>
+        <p:spPr/>
+        <p:txBody>
+          <a:bodyPr/>
+          <a:lstStyle/>
+          <a:p>
+            <a:r>
+              <a:rPr lang="en-US" dirty="0"/>
+              <a:t>Simulations: PC count</a:t>
+            </a:r>
+            <a:endParaRPr lang="ru-RU" dirty="0"/>
+          </a:p>
+        </p:txBody>
+      </p:sp>
+      <p:sp>
+        <p:nvSpPr>
+          <p:cNvPr id="3" name="Номер слайда 2"/>
+          <p:cNvSpPr>
+            <a:spLocks noGrp="1"/>
+          </p:cNvSpPr>
+          <p:nvPr>
+            <p:ph type="sldNum" sz="quarter" idx="12"/>
+          </p:nvPr>
+        </p:nvSpPr>
+        <p:spPr/>
+        <p:txBody>
+          <a:bodyPr/>
+          <a:lstStyle/>
+          <a:p>
+            <a:fld id="{8D0E1ED9-1B5C-4060-9004-48CB920062D4}" type="slidenum">
+              <a:rPr lang="ru-RU" smtClean="0"/>
+              <a:pPr/>
+              <a:t>51</a:t>
+            </a:fld>
+            <a:endParaRPr lang="ru-RU"/>
+          </a:p>
+        </p:txBody>
+      </p:sp>
+      <p:pic>
+        <p:nvPicPr>
+          <p:cNvPr id="5" name="Picture 4">
+            <a:extLst>
+              <a:ext uri="{FF2B5EF4-FFF2-40B4-BE49-F238E27FC236}">
+                <a16:creationId xmlns:a16="http://schemas.microsoft.com/office/drawing/2014/main" id="{A75E3EBE-EA24-4C69-BD61-9EF336BE4F22}"/>
+              </a:ext>
+            </a:extLst>
+          </p:cNvPr>
+          <p:cNvPicPr>
+            <a:picLocks noChangeAspect="1"/>
+          </p:cNvPicPr>
+          <p:nvPr/>
+        </p:nvPicPr>
+        <p:blipFill>
+          <a:blip r:embed="rId2">
+            <a:extLst>
+              <a:ext uri="{28A0092B-C50C-407E-A947-70E740481C1C}">
+                <a14:useLocalDpi xmlns:a14="http://schemas.microsoft.com/office/drawing/2010/main" val="0"/>
+              </a:ext>
+            </a:extLst>
+          </a:blip>
+          <a:stretch>
+            <a:fillRect/>
+          </a:stretch>
+        </p:blipFill>
+        <p:spPr>
+          <a:xfrm>
+            <a:off x="0" y="802217"/>
+            <a:ext cx="4572000" cy="2174488"/>
+          </a:xfrm>
+          <a:prstGeom prst="rect">
+            <a:avLst/>
+          </a:prstGeom>
+        </p:spPr>
+      </p:pic>
+      <p:pic>
+        <p:nvPicPr>
+          <p:cNvPr id="7" name="Picture 6">
+            <a:extLst>
+              <a:ext uri="{FF2B5EF4-FFF2-40B4-BE49-F238E27FC236}">
+                <a16:creationId xmlns:a16="http://schemas.microsoft.com/office/drawing/2014/main" id="{8D161C42-7B4A-47DA-8265-E818746E4FB7}"/>
+              </a:ext>
+            </a:extLst>
+          </p:cNvPr>
+          <p:cNvPicPr>
+            <a:picLocks noChangeAspect="1"/>
+          </p:cNvPicPr>
+          <p:nvPr/>
+        </p:nvPicPr>
+        <p:blipFill>
+          <a:blip r:embed="rId3">
+            <a:extLst>
+              <a:ext uri="{28A0092B-C50C-407E-A947-70E740481C1C}">
+                <a14:useLocalDpi xmlns:a14="http://schemas.microsoft.com/office/drawing/2010/main" val="0"/>
+              </a:ext>
+            </a:extLst>
+          </a:blip>
+          <a:stretch>
+            <a:fillRect/>
+          </a:stretch>
+        </p:blipFill>
+        <p:spPr>
+          <a:xfrm>
+            <a:off x="4572000" y="802216"/>
+            <a:ext cx="4572003" cy="2174489"/>
+          </a:xfrm>
+          <a:prstGeom prst="rect">
+            <a:avLst/>
+          </a:prstGeom>
+        </p:spPr>
+      </p:pic>
+      <p:pic>
+        <p:nvPicPr>
+          <p:cNvPr id="11" name="Picture 10">
+            <a:extLst>
+              <a:ext uri="{FF2B5EF4-FFF2-40B4-BE49-F238E27FC236}">
+                <a16:creationId xmlns:a16="http://schemas.microsoft.com/office/drawing/2014/main" id="{E68CD04E-3801-43DF-8E35-A2D05CCB9EEA}"/>
+              </a:ext>
+            </a:extLst>
+          </p:cNvPr>
+          <p:cNvPicPr>
+            <a:picLocks noChangeAspect="1"/>
+          </p:cNvPicPr>
+          <p:nvPr/>
+        </p:nvPicPr>
+        <p:blipFill>
+          <a:blip r:embed="rId4">
+            <a:extLst>
+              <a:ext uri="{28A0092B-C50C-407E-A947-70E740481C1C}">
+                <a14:useLocalDpi xmlns:a14="http://schemas.microsoft.com/office/drawing/2010/main" val="0"/>
+              </a:ext>
+            </a:extLst>
+          </a:blip>
+          <a:stretch>
+            <a:fillRect/>
+          </a:stretch>
+        </p:blipFill>
+        <p:spPr>
+          <a:xfrm>
+            <a:off x="0" y="3012618"/>
+            <a:ext cx="4572000" cy="2174488"/>
+          </a:xfrm>
+          <a:prstGeom prst="rect">
+            <a:avLst/>
+          </a:prstGeom>
+        </p:spPr>
+      </p:pic>
+      <p:pic>
+        <p:nvPicPr>
+          <p:cNvPr id="16" name="Picture 15">
+            <a:extLst>
+              <a:ext uri="{FF2B5EF4-FFF2-40B4-BE49-F238E27FC236}">
+                <a16:creationId xmlns:a16="http://schemas.microsoft.com/office/drawing/2014/main" id="{5AF9FE8D-5BA4-4F6B-A763-D3C8055CD447}"/>
+              </a:ext>
+            </a:extLst>
+          </p:cNvPr>
+          <p:cNvPicPr>
+            <a:picLocks noChangeAspect="1"/>
+          </p:cNvPicPr>
+          <p:nvPr/>
+        </p:nvPicPr>
+        <p:blipFill>
+          <a:blip r:embed="rId5">
+            <a:extLst>
+              <a:ext uri="{28A0092B-C50C-407E-A947-70E740481C1C}">
+                <a14:useLocalDpi xmlns:a14="http://schemas.microsoft.com/office/drawing/2010/main" val="0"/>
+              </a:ext>
+            </a:extLst>
+          </a:blip>
+          <a:stretch>
+            <a:fillRect/>
+          </a:stretch>
+        </p:blipFill>
+        <p:spPr>
+          <a:xfrm>
+            <a:off x="4572000" y="3012618"/>
+            <a:ext cx="4572000" cy="2174488"/>
+          </a:xfrm>
+          <a:prstGeom prst="rect">
+            <a:avLst/>
+          </a:prstGeom>
+        </p:spPr>
+      </p:pic>
+      <p:sp>
+        <p:nvSpPr>
+          <p:cNvPr id="18" name="TextBox 17">
+            <a:extLst>
+              <a:ext uri="{FF2B5EF4-FFF2-40B4-BE49-F238E27FC236}">
+                <a16:creationId xmlns:a16="http://schemas.microsoft.com/office/drawing/2014/main" id="{31EB7C67-3F7F-406D-BF4B-B7F3BCC88538}"/>
+              </a:ext>
+            </a:extLst>
+          </p:cNvPr>
+          <p:cNvSpPr txBox="1"/>
+          <p:nvPr/>
+        </p:nvSpPr>
+        <p:spPr>
+          <a:xfrm>
+            <a:off x="535982" y="1651899"/>
+            <a:ext cx="2533790" cy="938719"/>
+          </a:xfrm>
+          <a:prstGeom prst="rect">
+            <a:avLst/>
+          </a:prstGeom>
+          <a:noFill/>
+        </p:spPr>
+        <p:txBody>
+          <a:bodyPr wrap="square" rtlCol="0">
+            <a:spAutoFit/>
+          </a:bodyPr>
+          <a:lstStyle/>
+          <a:p>
+            <a:r>
+              <a:rPr lang="en-US" sz="1100" b="1" dirty="0"/>
+              <a:t>Virus initial concentration: </a:t>
+            </a:r>
+          </a:p>
+          <a:p>
+            <a:r>
+              <a:rPr lang="en-US" sz="1100" b="1" dirty="0"/>
+              <a:t>843 copies/mL</a:t>
+            </a:r>
+          </a:p>
+          <a:p>
+            <a:r>
+              <a:rPr lang="en-US" sz="1100" b="1" dirty="0">
+                <a:solidFill>
+                  <a:srgbClr val="0000FF"/>
+                </a:solidFill>
+              </a:rPr>
+              <a:t>1685 copies/mL</a:t>
+            </a:r>
+          </a:p>
+          <a:p>
+            <a:r>
+              <a:rPr lang="en-US" sz="1100" b="1" dirty="0">
+                <a:solidFill>
+                  <a:srgbClr val="FF0000"/>
+                </a:solidFill>
+              </a:rPr>
+              <a:t>3370 copies/mL</a:t>
+            </a:r>
+          </a:p>
+          <a:p>
+            <a:r>
+              <a:rPr lang="en-US" sz="1100" b="1" dirty="0">
+                <a:solidFill>
+                  <a:srgbClr val="00B050"/>
+                </a:solidFill>
+              </a:rPr>
+              <a:t>6740 copies/mL</a:t>
+            </a:r>
+            <a:endParaRPr lang="ru-RU" sz="1100" b="1" dirty="0">
+              <a:solidFill>
+                <a:srgbClr val="00B050"/>
+              </a:solidFill>
+            </a:endParaRPr>
+          </a:p>
+        </p:txBody>
+      </p:sp>
+      <p:sp>
+        <p:nvSpPr>
+          <p:cNvPr id="19" name="TextBox 18">
+            <a:extLst>
+              <a:ext uri="{FF2B5EF4-FFF2-40B4-BE49-F238E27FC236}">
+                <a16:creationId xmlns:a16="http://schemas.microsoft.com/office/drawing/2014/main" id="{533EC405-128C-4D2D-8646-05D49DDF1F6B}"/>
+              </a:ext>
+            </a:extLst>
+          </p:cNvPr>
+          <p:cNvSpPr txBox="1"/>
+          <p:nvPr/>
+        </p:nvSpPr>
+        <p:spPr>
+          <a:xfrm>
+            <a:off x="218958" y="5223019"/>
+            <a:ext cx="8706084" cy="1200329"/>
+          </a:xfrm>
+          <a:prstGeom prst="rect">
+            <a:avLst/>
+          </a:prstGeom>
+          <a:noFill/>
+        </p:spPr>
+        <p:txBody>
+          <a:bodyPr wrap="square" rtlCol="0">
+            <a:spAutoFit/>
+          </a:bodyPr>
+          <a:lstStyle/>
+          <a:p>
+            <a:pPr marL="285750" indent="-285750">
+              <a:buFont typeface="Arial" panose="020B0604020202020204" pitchFamily="34" charset="0"/>
+              <a:buChar char="•"/>
+            </a:pPr>
+            <a:r>
+              <a:rPr lang="en-US" dirty="0"/>
+              <a:t>Total PC declines more than 100 folds when initial virus concentration is above threshold. </a:t>
+            </a:r>
+            <a:r>
+              <a:rPr lang="en-US" dirty="0">
+                <a:solidFill>
+                  <a:srgbClr val="FF0000"/>
+                </a:solidFill>
+              </a:rPr>
+              <a:t>Looks strange if we consider that virus affect whole lung!</a:t>
+            </a:r>
+          </a:p>
+          <a:p>
+            <a:pPr marL="285750" indent="-285750">
+              <a:buFont typeface="Arial" panose="020B0604020202020204" pitchFamily="34" charset="0"/>
+              <a:buChar char="•"/>
+            </a:pPr>
+            <a:r>
+              <a:rPr lang="en-US" dirty="0"/>
+              <a:t>Total PC declines slightly if initial virus concentration is below threshold</a:t>
+            </a:r>
+          </a:p>
+          <a:p>
+            <a:pPr marL="285750" indent="-285750">
+              <a:buFont typeface="Arial" panose="020B0604020202020204" pitchFamily="34" charset="0"/>
+              <a:buChar char="•"/>
+            </a:pPr>
+            <a:r>
+              <a:rPr lang="en-US" dirty="0"/>
+              <a:t>Replenishment of PC cells takes about 80-90 days</a:t>
+            </a:r>
+            <a:endParaRPr lang="ru-RU" dirty="0"/>
+          </a:p>
+        </p:txBody>
+      </p:sp>
+    </p:spTree>
+    <p:extLst>
+      <p:ext uri="{BB962C8B-B14F-4D97-AF65-F5344CB8AC3E}">
+        <p14:creationId xmlns:p14="http://schemas.microsoft.com/office/powerpoint/2010/main" val="3792715777"/>
+      </p:ext>
+    </p:extLst>
+  </p:cSld>
+  <p:clrMapOvr>
+    <a:masterClrMapping/>
+  </p:clrMapOvr>
+</p:sld>
+</file>
+
+<file path=ppt/slides/slide52.xml><?xml version="1.0" encoding="utf-8"?>
+<p:sld xmlns:a="http://schemas.openxmlformats.org/drawingml/2006/main" xmlns:r="http://schemas.openxmlformats.org/officeDocument/2006/relationships" xmlns:p="http://schemas.openxmlformats.org/presentationml/2006/main">
+  <p:cSld>
+    <p:spTree>
+      <p:nvGrpSpPr>
+        <p:cNvPr id="1" name=""/>
+        <p:cNvGrpSpPr/>
+        <p:nvPr/>
+      </p:nvGrpSpPr>
+      <p:grpSpPr>
+        <a:xfrm>
+          <a:off x="0" y="0"/>
+          <a:ext cx="0" cy="0"/>
+          <a:chOff x="0" y="0"/>
+          <a:chExt cx="0" cy="0"/>
+        </a:xfrm>
+      </p:grpSpPr>
+      <p:sp>
+        <p:nvSpPr>
+          <p:cNvPr id="2" name="Заголовок 1"/>
+          <p:cNvSpPr>
+            <a:spLocks noGrp="1"/>
+          </p:cNvSpPr>
+          <p:nvPr>
+            <p:ph type="title"/>
+          </p:nvPr>
+        </p:nvSpPr>
+        <p:spPr>
+          <a:xfrm>
+            <a:off x="412518" y="294506"/>
+            <a:ext cx="8610184" cy="507710"/>
+          </a:xfrm>
+        </p:spPr>
+        <p:txBody>
+          <a:bodyPr>
+            <a:normAutofit/>
+          </a:bodyPr>
+          <a:lstStyle/>
+          <a:p>
+            <a:r>
+              <a:rPr lang="en-US" dirty="0"/>
+              <a:t>Simulations: % of PC, </a:t>
+            </a:r>
+            <a:r>
+              <a:rPr lang="en-US" dirty="0" err="1"/>
+              <a:t>iPC</a:t>
+            </a:r>
+            <a:r>
+              <a:rPr lang="en-US" dirty="0"/>
+              <a:t>, </a:t>
+            </a:r>
+            <a:r>
+              <a:rPr lang="en-US" dirty="0" err="1"/>
+              <a:t>vPC</a:t>
+            </a:r>
+            <a:r>
+              <a:rPr lang="en-US" dirty="0"/>
+              <a:t> of </a:t>
+            </a:r>
+            <a:r>
+              <a:rPr lang="en-US" dirty="0" err="1"/>
+              <a:t>PC_tot</a:t>
+            </a:r>
+            <a:endParaRPr lang="ru-RU" dirty="0"/>
+          </a:p>
+        </p:txBody>
+      </p:sp>
+      <p:sp>
+        <p:nvSpPr>
+          <p:cNvPr id="3" name="Номер слайда 2"/>
+          <p:cNvSpPr>
+            <a:spLocks noGrp="1"/>
+          </p:cNvSpPr>
+          <p:nvPr>
+            <p:ph type="sldNum" sz="quarter" idx="12"/>
+          </p:nvPr>
+        </p:nvSpPr>
+        <p:spPr/>
+        <p:txBody>
+          <a:bodyPr/>
+          <a:lstStyle/>
+          <a:p>
+            <a:fld id="{8D0E1ED9-1B5C-4060-9004-48CB920062D4}" type="slidenum">
+              <a:rPr lang="ru-RU" smtClean="0"/>
+              <a:pPr/>
+              <a:t>52</a:t>
+            </a:fld>
+            <a:endParaRPr lang="ru-RU"/>
+          </a:p>
+        </p:txBody>
+      </p:sp>
+      <p:pic>
+        <p:nvPicPr>
+          <p:cNvPr id="6" name="Picture 5">
+            <a:extLst>
+              <a:ext uri="{FF2B5EF4-FFF2-40B4-BE49-F238E27FC236}">
+                <a16:creationId xmlns:a16="http://schemas.microsoft.com/office/drawing/2014/main" id="{FE79B807-6DE6-4F23-AD44-792DB9762FCB}"/>
+              </a:ext>
+            </a:extLst>
+          </p:cNvPr>
+          <p:cNvPicPr>
+            <a:picLocks noChangeAspect="1"/>
+          </p:cNvPicPr>
+          <p:nvPr/>
+        </p:nvPicPr>
+        <p:blipFill>
+          <a:blip r:embed="rId2">
+            <a:extLst>
+              <a:ext uri="{28A0092B-C50C-407E-A947-70E740481C1C}">
+                <a14:useLocalDpi xmlns:a14="http://schemas.microsoft.com/office/drawing/2010/main" val="0"/>
+              </a:ext>
+            </a:extLst>
+          </a:blip>
+          <a:stretch>
+            <a:fillRect/>
+          </a:stretch>
+        </p:blipFill>
+        <p:spPr>
+          <a:xfrm>
+            <a:off x="-1" y="769195"/>
+            <a:ext cx="5318449" cy="2580498"/>
+          </a:xfrm>
+          <a:prstGeom prst="rect">
+            <a:avLst/>
+          </a:prstGeom>
+        </p:spPr>
+      </p:pic>
+      <p:pic>
+        <p:nvPicPr>
+          <p:cNvPr id="9" name="Picture 8">
+            <a:extLst>
+              <a:ext uri="{FF2B5EF4-FFF2-40B4-BE49-F238E27FC236}">
+                <a16:creationId xmlns:a16="http://schemas.microsoft.com/office/drawing/2014/main" id="{335AD3EC-57F9-4FE0-BA0F-B8BF531789B4}"/>
+              </a:ext>
+            </a:extLst>
+          </p:cNvPr>
+          <p:cNvPicPr>
+            <a:picLocks noChangeAspect="1"/>
+          </p:cNvPicPr>
+          <p:nvPr/>
+        </p:nvPicPr>
+        <p:blipFill>
+          <a:blip r:embed="rId3">
+            <a:extLst>
+              <a:ext uri="{28A0092B-C50C-407E-A947-70E740481C1C}">
+                <a14:useLocalDpi xmlns:a14="http://schemas.microsoft.com/office/drawing/2010/main" val="0"/>
+              </a:ext>
+            </a:extLst>
+          </a:blip>
+          <a:stretch>
+            <a:fillRect/>
+          </a:stretch>
+        </p:blipFill>
+        <p:spPr>
+          <a:xfrm>
+            <a:off x="4385388" y="766942"/>
+            <a:ext cx="4758612" cy="2580498"/>
+          </a:xfrm>
+          <a:prstGeom prst="rect">
+            <a:avLst/>
+          </a:prstGeom>
+        </p:spPr>
+      </p:pic>
+      <p:pic>
+        <p:nvPicPr>
+          <p:cNvPr id="15" name="Picture 14">
+            <a:extLst>
+              <a:ext uri="{FF2B5EF4-FFF2-40B4-BE49-F238E27FC236}">
+                <a16:creationId xmlns:a16="http://schemas.microsoft.com/office/drawing/2014/main" id="{6A9150CA-2147-479A-BD95-4267A7FD7FFD}"/>
+              </a:ext>
+            </a:extLst>
+          </p:cNvPr>
+          <p:cNvPicPr>
+            <a:picLocks noChangeAspect="1"/>
+          </p:cNvPicPr>
+          <p:nvPr/>
+        </p:nvPicPr>
+        <p:blipFill>
+          <a:blip r:embed="rId4">
+            <a:extLst>
+              <a:ext uri="{28A0092B-C50C-407E-A947-70E740481C1C}">
+                <a14:useLocalDpi xmlns:a14="http://schemas.microsoft.com/office/drawing/2010/main" val="0"/>
+              </a:ext>
+            </a:extLst>
+          </a:blip>
+          <a:stretch>
+            <a:fillRect/>
+          </a:stretch>
+        </p:blipFill>
+        <p:spPr>
+          <a:xfrm>
+            <a:off x="-1" y="3347440"/>
+            <a:ext cx="5318449" cy="2529506"/>
+          </a:xfrm>
+          <a:prstGeom prst="rect">
+            <a:avLst/>
+          </a:prstGeom>
+        </p:spPr>
+      </p:pic>
+      <p:pic>
+        <p:nvPicPr>
+          <p:cNvPr id="17" name="Picture 16">
+            <a:extLst>
+              <a:ext uri="{FF2B5EF4-FFF2-40B4-BE49-F238E27FC236}">
+                <a16:creationId xmlns:a16="http://schemas.microsoft.com/office/drawing/2014/main" id="{996906AC-33B7-465A-9279-7AA3B2902BE0}"/>
+              </a:ext>
+            </a:extLst>
+          </p:cNvPr>
+          <p:cNvPicPr>
+            <a:picLocks noChangeAspect="1"/>
+          </p:cNvPicPr>
+          <p:nvPr/>
+        </p:nvPicPr>
+        <p:blipFill>
+          <a:blip r:embed="rId5">
+            <a:extLst>
+              <a:ext uri="{28A0092B-C50C-407E-A947-70E740481C1C}">
+                <a14:useLocalDpi xmlns:a14="http://schemas.microsoft.com/office/drawing/2010/main" val="0"/>
+              </a:ext>
+            </a:extLst>
+          </a:blip>
+          <a:stretch>
+            <a:fillRect/>
+          </a:stretch>
+        </p:blipFill>
+        <p:spPr>
+          <a:xfrm>
+            <a:off x="4385389" y="3347440"/>
+            <a:ext cx="4758612" cy="2529506"/>
+          </a:xfrm>
+          <a:prstGeom prst="rect">
+            <a:avLst/>
+          </a:prstGeom>
+        </p:spPr>
+      </p:pic>
+      <p:sp>
+        <p:nvSpPr>
+          <p:cNvPr id="19" name="TextBox 18">
+            <a:extLst>
+              <a:ext uri="{FF2B5EF4-FFF2-40B4-BE49-F238E27FC236}">
+                <a16:creationId xmlns:a16="http://schemas.microsoft.com/office/drawing/2014/main" id="{23FAC3AD-DB8D-4CE3-A458-0B286A33C25F}"/>
+              </a:ext>
+            </a:extLst>
+          </p:cNvPr>
+          <p:cNvSpPr txBox="1"/>
+          <p:nvPr/>
+        </p:nvSpPr>
+        <p:spPr>
+          <a:xfrm>
+            <a:off x="1153995" y="700660"/>
+            <a:ext cx="2828595" cy="369332"/>
+          </a:xfrm>
+          <a:prstGeom prst="rect">
+            <a:avLst/>
+          </a:prstGeom>
+          <a:noFill/>
+        </p:spPr>
+        <p:txBody>
+          <a:bodyPr wrap="none" rtlCol="0">
+            <a:spAutoFit/>
+          </a:bodyPr>
+          <a:lstStyle/>
+          <a:p>
+            <a:r>
+              <a:rPr lang="en-US" b="1" dirty="0" err="1"/>
+              <a:t>COVinit</a:t>
+            </a:r>
+            <a:r>
+              <a:rPr lang="en-US" b="1" dirty="0"/>
+              <a:t>=843 copies/mL</a:t>
+            </a:r>
+          </a:p>
+        </p:txBody>
+      </p:sp>
+      <p:sp>
+        <p:nvSpPr>
+          <p:cNvPr id="20" name="TextBox 19">
+            <a:extLst>
+              <a:ext uri="{FF2B5EF4-FFF2-40B4-BE49-F238E27FC236}">
+                <a16:creationId xmlns:a16="http://schemas.microsoft.com/office/drawing/2014/main" id="{2FA4A92E-B0B7-4BC4-AEB9-309CC75DE869}"/>
+              </a:ext>
+            </a:extLst>
+          </p:cNvPr>
+          <p:cNvSpPr txBox="1"/>
+          <p:nvPr/>
+        </p:nvSpPr>
+        <p:spPr>
+          <a:xfrm>
+            <a:off x="5309227" y="703767"/>
+            <a:ext cx="2940805" cy="369332"/>
+          </a:xfrm>
+          <a:prstGeom prst="rect">
+            <a:avLst/>
+          </a:prstGeom>
+          <a:noFill/>
+        </p:spPr>
+        <p:txBody>
+          <a:bodyPr wrap="none" rtlCol="0">
+            <a:spAutoFit/>
+          </a:bodyPr>
+          <a:lstStyle/>
+          <a:p>
+            <a:r>
+              <a:rPr lang="en-US" b="1" dirty="0" err="1"/>
+              <a:t>COVinit</a:t>
+            </a:r>
+            <a:r>
+              <a:rPr lang="en-US" b="1" dirty="0"/>
+              <a:t>=1685 copies/mL</a:t>
+            </a:r>
+          </a:p>
+        </p:txBody>
+      </p:sp>
+      <p:sp>
+        <p:nvSpPr>
+          <p:cNvPr id="21" name="TextBox 20">
+            <a:extLst>
+              <a:ext uri="{FF2B5EF4-FFF2-40B4-BE49-F238E27FC236}">
+                <a16:creationId xmlns:a16="http://schemas.microsoft.com/office/drawing/2014/main" id="{852096A5-26DB-4542-B265-E8DAEE6F00C3}"/>
+              </a:ext>
+            </a:extLst>
+          </p:cNvPr>
+          <p:cNvSpPr txBox="1"/>
+          <p:nvPr/>
+        </p:nvSpPr>
+        <p:spPr>
+          <a:xfrm>
+            <a:off x="1075556" y="3278905"/>
+            <a:ext cx="2953629" cy="369332"/>
+          </a:xfrm>
+          <a:prstGeom prst="rect">
+            <a:avLst/>
+          </a:prstGeom>
+          <a:noFill/>
+        </p:spPr>
+        <p:txBody>
+          <a:bodyPr wrap="none" rtlCol="0">
+            <a:spAutoFit/>
+          </a:bodyPr>
+          <a:lstStyle/>
+          <a:p>
+            <a:r>
+              <a:rPr lang="en-US" b="1" dirty="0" err="1"/>
+              <a:t>COVinit</a:t>
+            </a:r>
+            <a:r>
+              <a:rPr lang="en-US" b="1" dirty="0"/>
+              <a:t>=3370 copies/mL</a:t>
+            </a:r>
+          </a:p>
+        </p:txBody>
+      </p:sp>
+      <p:sp>
+        <p:nvSpPr>
+          <p:cNvPr id="22" name="TextBox 21">
+            <a:extLst>
+              <a:ext uri="{FF2B5EF4-FFF2-40B4-BE49-F238E27FC236}">
+                <a16:creationId xmlns:a16="http://schemas.microsoft.com/office/drawing/2014/main" id="{554DEA5E-52E6-48F8-9C74-CFD4810D26D4}"/>
+              </a:ext>
+            </a:extLst>
+          </p:cNvPr>
+          <p:cNvSpPr txBox="1"/>
+          <p:nvPr/>
+        </p:nvSpPr>
+        <p:spPr>
+          <a:xfrm>
+            <a:off x="5239849" y="3278905"/>
+            <a:ext cx="2959080" cy="369332"/>
+          </a:xfrm>
+          <a:prstGeom prst="rect">
+            <a:avLst/>
+          </a:prstGeom>
+          <a:noFill/>
+        </p:spPr>
+        <p:txBody>
+          <a:bodyPr wrap="none" rtlCol="0">
+            <a:spAutoFit/>
+          </a:bodyPr>
+          <a:lstStyle/>
+          <a:p>
+            <a:r>
+              <a:rPr lang="en-US" b="1" dirty="0" err="1"/>
+              <a:t>COVinit</a:t>
+            </a:r>
+            <a:r>
+              <a:rPr lang="en-US" b="1" dirty="0"/>
+              <a:t>=6740 copies/mL</a:t>
+            </a:r>
+          </a:p>
+        </p:txBody>
+      </p:sp>
+      <p:sp>
+        <p:nvSpPr>
+          <p:cNvPr id="23" name="TextBox 22">
+            <a:extLst>
+              <a:ext uri="{FF2B5EF4-FFF2-40B4-BE49-F238E27FC236}">
+                <a16:creationId xmlns:a16="http://schemas.microsoft.com/office/drawing/2014/main" id="{DDDBB949-07B5-4F1E-BFFD-C01372374BDD}"/>
+              </a:ext>
+            </a:extLst>
+          </p:cNvPr>
+          <p:cNvSpPr txBox="1"/>
+          <p:nvPr/>
+        </p:nvSpPr>
+        <p:spPr>
+          <a:xfrm>
+            <a:off x="666341" y="1059297"/>
+            <a:ext cx="1886029" cy="369332"/>
+          </a:xfrm>
+          <a:prstGeom prst="rect">
+            <a:avLst/>
+          </a:prstGeom>
+          <a:noFill/>
+        </p:spPr>
+        <p:txBody>
+          <a:bodyPr wrap="none" rtlCol="0">
+            <a:spAutoFit/>
+          </a:bodyPr>
+          <a:lstStyle/>
+          <a:p>
+            <a:r>
+              <a:rPr lang="en-US" dirty="0">
+                <a:solidFill>
+                  <a:srgbClr val="00B050"/>
+                </a:solidFill>
+              </a:rPr>
+              <a:t>below threshold</a:t>
+            </a:r>
+            <a:endParaRPr lang="ru-RU" dirty="0">
+              <a:solidFill>
+                <a:srgbClr val="00B050"/>
+              </a:solidFill>
+            </a:endParaRPr>
+          </a:p>
+        </p:txBody>
+      </p:sp>
+      <p:sp>
+        <p:nvSpPr>
+          <p:cNvPr id="24" name="TextBox 23">
+            <a:extLst>
+              <a:ext uri="{FF2B5EF4-FFF2-40B4-BE49-F238E27FC236}">
+                <a16:creationId xmlns:a16="http://schemas.microsoft.com/office/drawing/2014/main" id="{6E49347D-86F4-4B25-AFBB-CAAEF983A963}"/>
+              </a:ext>
+            </a:extLst>
+          </p:cNvPr>
+          <p:cNvSpPr txBox="1"/>
+          <p:nvPr/>
+        </p:nvSpPr>
+        <p:spPr>
+          <a:xfrm>
+            <a:off x="4915137" y="1047117"/>
+            <a:ext cx="1886029" cy="369332"/>
+          </a:xfrm>
+          <a:prstGeom prst="rect">
+            <a:avLst/>
+          </a:prstGeom>
+          <a:noFill/>
+        </p:spPr>
+        <p:txBody>
+          <a:bodyPr wrap="none" rtlCol="0">
+            <a:spAutoFit/>
+          </a:bodyPr>
+          <a:lstStyle/>
+          <a:p>
+            <a:r>
+              <a:rPr lang="en-US" dirty="0">
+                <a:solidFill>
+                  <a:srgbClr val="00B050"/>
+                </a:solidFill>
+              </a:rPr>
+              <a:t>below threshold</a:t>
+            </a:r>
+            <a:endParaRPr lang="ru-RU" dirty="0">
+              <a:solidFill>
+                <a:srgbClr val="00B050"/>
+              </a:solidFill>
+            </a:endParaRPr>
+          </a:p>
+        </p:txBody>
+      </p:sp>
+      <p:sp>
+        <p:nvSpPr>
+          <p:cNvPr id="25" name="TextBox 24">
+            <a:extLst>
+              <a:ext uri="{FF2B5EF4-FFF2-40B4-BE49-F238E27FC236}">
+                <a16:creationId xmlns:a16="http://schemas.microsoft.com/office/drawing/2014/main" id="{EDD908E2-8692-4F86-96CC-122CABC1A9FD}"/>
+              </a:ext>
+            </a:extLst>
+          </p:cNvPr>
+          <p:cNvSpPr txBox="1"/>
+          <p:nvPr/>
+        </p:nvSpPr>
+        <p:spPr>
+          <a:xfrm>
+            <a:off x="2335941" y="5096018"/>
+            <a:ext cx="1871346" cy="369332"/>
+          </a:xfrm>
+          <a:prstGeom prst="rect">
+            <a:avLst/>
+          </a:prstGeom>
+          <a:noFill/>
+        </p:spPr>
+        <p:txBody>
+          <a:bodyPr wrap="none" rtlCol="0">
+            <a:spAutoFit/>
+          </a:bodyPr>
+          <a:lstStyle/>
+          <a:p>
+            <a:r>
+              <a:rPr lang="en-US" dirty="0">
+                <a:solidFill>
+                  <a:srgbClr val="FF0000"/>
+                </a:solidFill>
+              </a:rPr>
+              <a:t>above threshold</a:t>
+            </a:r>
+            <a:endParaRPr lang="ru-RU" dirty="0">
+              <a:solidFill>
+                <a:srgbClr val="FF0000"/>
+              </a:solidFill>
+            </a:endParaRPr>
+          </a:p>
+        </p:txBody>
+      </p:sp>
+      <p:sp>
+        <p:nvSpPr>
+          <p:cNvPr id="26" name="TextBox 25">
+            <a:extLst>
+              <a:ext uri="{FF2B5EF4-FFF2-40B4-BE49-F238E27FC236}">
+                <a16:creationId xmlns:a16="http://schemas.microsoft.com/office/drawing/2014/main" id="{139D6C8E-077A-4081-8763-FF67B22DF8EC}"/>
+              </a:ext>
+            </a:extLst>
+          </p:cNvPr>
+          <p:cNvSpPr txBox="1"/>
+          <p:nvPr/>
+        </p:nvSpPr>
+        <p:spPr>
+          <a:xfrm>
+            <a:off x="6327583" y="5067548"/>
+            <a:ext cx="1871346" cy="369332"/>
+          </a:xfrm>
+          <a:prstGeom prst="rect">
+            <a:avLst/>
+          </a:prstGeom>
+          <a:noFill/>
+        </p:spPr>
+        <p:txBody>
+          <a:bodyPr wrap="none" rtlCol="0">
+            <a:spAutoFit/>
+          </a:bodyPr>
+          <a:lstStyle/>
+          <a:p>
+            <a:r>
+              <a:rPr lang="en-US" dirty="0">
+                <a:solidFill>
+                  <a:srgbClr val="FF0000"/>
+                </a:solidFill>
+              </a:rPr>
+              <a:t>above threshold</a:t>
+            </a:r>
+            <a:endParaRPr lang="ru-RU" dirty="0">
+              <a:solidFill>
+                <a:srgbClr val="FF0000"/>
+              </a:solidFill>
+            </a:endParaRPr>
+          </a:p>
+        </p:txBody>
+      </p:sp>
+      <p:sp>
+        <p:nvSpPr>
+          <p:cNvPr id="27" name="TextBox 26">
+            <a:extLst>
+              <a:ext uri="{FF2B5EF4-FFF2-40B4-BE49-F238E27FC236}">
+                <a16:creationId xmlns:a16="http://schemas.microsoft.com/office/drawing/2014/main" id="{63C2E6AE-EB11-475E-ABBC-DB7F7F3EB0D0}"/>
+              </a:ext>
+            </a:extLst>
+          </p:cNvPr>
+          <p:cNvSpPr txBox="1"/>
+          <p:nvPr/>
+        </p:nvSpPr>
+        <p:spPr>
+          <a:xfrm>
+            <a:off x="218958" y="5941476"/>
+            <a:ext cx="8706084" cy="646331"/>
+          </a:xfrm>
+          <a:prstGeom prst="rect">
+            <a:avLst/>
+          </a:prstGeom>
+          <a:noFill/>
+        </p:spPr>
+        <p:txBody>
+          <a:bodyPr wrap="square" rtlCol="0">
+            <a:spAutoFit/>
+          </a:bodyPr>
+          <a:lstStyle/>
+          <a:p>
+            <a:pPr marL="285750" indent="-285750">
+              <a:buFont typeface="Arial" panose="020B0604020202020204" pitchFamily="34" charset="0"/>
+              <a:buChar char="•"/>
+            </a:pPr>
+            <a:r>
+              <a:rPr lang="en-US" dirty="0"/>
+              <a:t>At day 10 or nearby almost all 100% of PC are in </a:t>
+            </a:r>
+            <a:r>
+              <a:rPr lang="en-US" dirty="0" err="1"/>
+              <a:t>vPC</a:t>
+            </a:r>
+            <a:r>
+              <a:rPr lang="en-US" dirty="0"/>
+              <a:t> state when initial virus concentration is above threshold.</a:t>
+            </a:r>
+          </a:p>
+        </p:txBody>
+      </p:sp>
+    </p:spTree>
+    <p:extLst>
+      <p:ext uri="{BB962C8B-B14F-4D97-AF65-F5344CB8AC3E}">
+        <p14:creationId xmlns:p14="http://schemas.microsoft.com/office/powerpoint/2010/main" val="2182199905"/>
+      </p:ext>
+    </p:extLst>
+  </p:cSld>
+  <p:clrMapOvr>
+    <a:masterClrMapping/>
+  </p:clrMapOvr>
+</p:sld>
+</file>
+
+<file path=ppt/slides/slide53.xml><?xml version="1.0" encoding="utf-8"?>
+<p:sld xmlns:a="http://schemas.openxmlformats.org/drawingml/2006/main" xmlns:r="http://schemas.openxmlformats.org/officeDocument/2006/relationships" xmlns:p="http://schemas.openxmlformats.org/presentationml/2006/main">
+  <p:cSld>
+    <p:spTree>
+      <p:nvGrpSpPr>
+        <p:cNvPr id="1" name=""/>
+        <p:cNvGrpSpPr/>
+        <p:nvPr/>
+      </p:nvGrpSpPr>
+      <p:grpSpPr>
+        <a:xfrm>
+          <a:off x="0" y="0"/>
+          <a:ext cx="0" cy="0"/>
+          <a:chOff x="0" y="0"/>
+          <a:chExt cx="0" cy="0"/>
+        </a:xfrm>
+      </p:grpSpPr>
+      <p:sp>
+        <p:nvSpPr>
+          <p:cNvPr id="2" name="Title 1">
+            <a:extLst>
+              <a:ext uri="{FF2B5EF4-FFF2-40B4-BE49-F238E27FC236}">
+                <a16:creationId xmlns:a16="http://schemas.microsoft.com/office/drawing/2014/main" id="{92D571E6-D4E2-4AE3-8E98-218E5E98495D}"/>
+              </a:ext>
+            </a:extLst>
+          </p:cNvPr>
+          <p:cNvSpPr>
+            <a:spLocks noGrp="1"/>
+          </p:cNvSpPr>
+          <p:nvPr>
+            <p:ph type="title"/>
+          </p:nvPr>
+        </p:nvSpPr>
+        <p:spPr/>
+        <p:txBody>
+          <a:bodyPr/>
+          <a:lstStyle/>
+          <a:p>
+            <a:r>
+              <a:rPr lang="en-US" dirty="0"/>
+              <a:t>ACE2 on cell surface</a:t>
+            </a:r>
+            <a:endParaRPr lang="ru-RU" dirty="0"/>
+          </a:p>
+        </p:txBody>
+      </p:sp>
+      <p:sp>
+        <p:nvSpPr>
+          <p:cNvPr id="3" name="Text Placeholder 2">
+            <a:extLst>
+              <a:ext uri="{FF2B5EF4-FFF2-40B4-BE49-F238E27FC236}">
+                <a16:creationId xmlns:a16="http://schemas.microsoft.com/office/drawing/2014/main" id="{5E908F9F-5181-4F24-AC97-631472E557AD}"/>
+              </a:ext>
+            </a:extLst>
+          </p:cNvPr>
+          <p:cNvSpPr>
+            <a:spLocks noGrp="1"/>
+          </p:cNvSpPr>
+          <p:nvPr>
+            <p:ph type="body" idx="1"/>
+          </p:nvPr>
+        </p:nvSpPr>
+        <p:spPr/>
+        <p:txBody>
+          <a:bodyPr/>
+          <a:lstStyle/>
+          <a:p>
+            <a:r>
+              <a:rPr lang="en-US" dirty="0"/>
+              <a:t>Diagnostic simulations of key model species and characteristics</a:t>
+            </a:r>
+            <a:endParaRPr lang="ru-RU" dirty="0"/>
+          </a:p>
+          <a:p>
+            <a:endParaRPr lang="ru-RU" dirty="0"/>
+          </a:p>
+        </p:txBody>
+      </p:sp>
+      <p:sp>
+        <p:nvSpPr>
+          <p:cNvPr id="4" name="Slide Number Placeholder 3">
+            <a:extLst>
+              <a:ext uri="{FF2B5EF4-FFF2-40B4-BE49-F238E27FC236}">
+                <a16:creationId xmlns:a16="http://schemas.microsoft.com/office/drawing/2014/main" id="{41D1849F-D011-4207-B5EE-67B6C180C3AC}"/>
+              </a:ext>
+            </a:extLst>
+          </p:cNvPr>
+          <p:cNvSpPr>
+            <a:spLocks noGrp="1"/>
+          </p:cNvSpPr>
+          <p:nvPr>
+            <p:ph type="sldNum" sz="quarter" idx="12"/>
+          </p:nvPr>
+        </p:nvSpPr>
+        <p:spPr/>
+        <p:txBody>
+          <a:bodyPr/>
+          <a:lstStyle/>
+          <a:p>
+            <a:fld id="{8D0E1ED9-1B5C-4060-9004-48CB920062D4}" type="slidenum">
+              <a:rPr lang="ru-RU" smtClean="0"/>
+              <a:pPr/>
+              <a:t>53</a:t>
+            </a:fld>
+            <a:endParaRPr lang="ru-RU"/>
+          </a:p>
+        </p:txBody>
+      </p:sp>
+    </p:spTree>
+    <p:extLst>
+      <p:ext uri="{BB962C8B-B14F-4D97-AF65-F5344CB8AC3E}">
+        <p14:creationId xmlns:p14="http://schemas.microsoft.com/office/powerpoint/2010/main" val="3045413697"/>
+      </p:ext>
+    </p:extLst>
+  </p:cSld>
+  <p:clrMapOvr>
+    <a:masterClrMapping/>
+  </p:clrMapOvr>
+</p:sld>
+</file>
+
+<file path=ppt/slides/slide54.xml><?xml version="1.0" encoding="utf-8"?>
+<p:sld xmlns:a="http://schemas.openxmlformats.org/drawingml/2006/main" xmlns:r="http://schemas.openxmlformats.org/officeDocument/2006/relationships" xmlns:p="http://schemas.openxmlformats.org/presentationml/2006/main">
+  <p:cSld>
+    <p:spTree>
+      <p:nvGrpSpPr>
+        <p:cNvPr id="1" name=""/>
+        <p:cNvGrpSpPr/>
+        <p:nvPr/>
+      </p:nvGrpSpPr>
+      <p:grpSpPr>
+        <a:xfrm>
+          <a:off x="0" y="0"/>
+          <a:ext cx="0" cy="0"/>
+          <a:chOff x="0" y="0"/>
+          <a:chExt cx="0" cy="0"/>
+        </a:xfrm>
+      </p:grpSpPr>
+      <p:sp>
+        <p:nvSpPr>
+          <p:cNvPr id="2" name="Заголовок 1"/>
+          <p:cNvSpPr>
+            <a:spLocks noGrp="1"/>
+          </p:cNvSpPr>
+          <p:nvPr>
+            <p:ph type="title"/>
+          </p:nvPr>
+        </p:nvSpPr>
+        <p:spPr/>
+        <p:txBody>
+          <a:bodyPr>
+            <a:normAutofit fontScale="90000"/>
+          </a:bodyPr>
+          <a:lstStyle/>
+          <a:p>
+            <a:r>
+              <a:rPr lang="en-US" dirty="0"/>
+              <a:t>Simulations: free and total ACE2 on PC surface</a:t>
+            </a:r>
+            <a:endParaRPr lang="ru-RU" dirty="0"/>
+          </a:p>
+        </p:txBody>
+      </p:sp>
+      <p:sp>
+        <p:nvSpPr>
+          <p:cNvPr id="3" name="Номер слайда 2"/>
+          <p:cNvSpPr>
+            <a:spLocks noGrp="1"/>
+          </p:cNvSpPr>
+          <p:nvPr>
+            <p:ph type="sldNum" sz="quarter" idx="12"/>
+          </p:nvPr>
+        </p:nvSpPr>
+        <p:spPr/>
+        <p:txBody>
+          <a:bodyPr/>
+          <a:lstStyle/>
+          <a:p>
+            <a:fld id="{8D0E1ED9-1B5C-4060-9004-48CB920062D4}" type="slidenum">
+              <a:rPr lang="ru-RU" smtClean="0"/>
+              <a:pPr/>
+              <a:t>54</a:t>
+            </a:fld>
+            <a:endParaRPr lang="ru-RU"/>
+          </a:p>
+        </p:txBody>
+      </p:sp>
+      <p:pic>
+        <p:nvPicPr>
+          <p:cNvPr id="5" name="Picture 4">
+            <a:extLst>
+              <a:ext uri="{FF2B5EF4-FFF2-40B4-BE49-F238E27FC236}">
+                <a16:creationId xmlns:a16="http://schemas.microsoft.com/office/drawing/2014/main" id="{0419AE10-979C-46FC-A582-23A0BD330665}"/>
+              </a:ext>
+            </a:extLst>
+          </p:cNvPr>
+          <p:cNvPicPr>
+            <a:picLocks noChangeAspect="1"/>
+          </p:cNvPicPr>
+          <p:nvPr/>
+        </p:nvPicPr>
+        <p:blipFill>
+          <a:blip r:embed="rId2">
+            <a:extLst>
+              <a:ext uri="{28A0092B-C50C-407E-A947-70E740481C1C}">
+                <a14:useLocalDpi xmlns:a14="http://schemas.microsoft.com/office/drawing/2010/main" val="0"/>
+              </a:ext>
+            </a:extLst>
+          </a:blip>
+          <a:stretch>
+            <a:fillRect/>
+          </a:stretch>
+        </p:blipFill>
+        <p:spPr>
+          <a:xfrm>
+            <a:off x="-1" y="712571"/>
+            <a:ext cx="3715881" cy="1930950"/>
+          </a:xfrm>
+          <a:prstGeom prst="rect">
+            <a:avLst/>
+          </a:prstGeom>
+        </p:spPr>
+      </p:pic>
+      <p:pic>
+        <p:nvPicPr>
+          <p:cNvPr id="8" name="Picture 7">
+            <a:extLst>
+              <a:ext uri="{FF2B5EF4-FFF2-40B4-BE49-F238E27FC236}">
+                <a16:creationId xmlns:a16="http://schemas.microsoft.com/office/drawing/2014/main" id="{EC08A205-BE75-4D35-9F0D-1C5D0188F933}"/>
+              </a:ext>
+            </a:extLst>
+          </p:cNvPr>
+          <p:cNvPicPr>
+            <a:picLocks noChangeAspect="1"/>
+          </p:cNvPicPr>
+          <p:nvPr/>
+        </p:nvPicPr>
+        <p:blipFill>
+          <a:blip r:embed="rId3">
+            <a:extLst>
+              <a:ext uri="{28A0092B-C50C-407E-A947-70E740481C1C}">
+                <a14:useLocalDpi xmlns:a14="http://schemas.microsoft.com/office/drawing/2010/main" val="0"/>
+              </a:ext>
+            </a:extLst>
+          </a:blip>
+          <a:stretch>
+            <a:fillRect/>
+          </a:stretch>
+        </p:blipFill>
+        <p:spPr>
+          <a:xfrm>
+            <a:off x="0" y="2484894"/>
+            <a:ext cx="3715883" cy="1930950"/>
+          </a:xfrm>
+          <a:prstGeom prst="rect">
+            <a:avLst/>
+          </a:prstGeom>
+        </p:spPr>
+      </p:pic>
+      <p:pic>
+        <p:nvPicPr>
+          <p:cNvPr id="12" name="Picture 11">
+            <a:extLst>
+              <a:ext uri="{FF2B5EF4-FFF2-40B4-BE49-F238E27FC236}">
+                <a16:creationId xmlns:a16="http://schemas.microsoft.com/office/drawing/2014/main" id="{D0CF10AC-B805-4556-B05A-1C642EDBF0BB}"/>
+              </a:ext>
+            </a:extLst>
+          </p:cNvPr>
+          <p:cNvPicPr>
+            <a:picLocks noChangeAspect="1"/>
+          </p:cNvPicPr>
+          <p:nvPr/>
+        </p:nvPicPr>
+        <p:blipFill>
+          <a:blip r:embed="rId4">
+            <a:extLst>
+              <a:ext uri="{28A0092B-C50C-407E-A947-70E740481C1C}">
+                <a14:useLocalDpi xmlns:a14="http://schemas.microsoft.com/office/drawing/2010/main" val="0"/>
+              </a:ext>
+            </a:extLst>
+          </a:blip>
+          <a:stretch>
+            <a:fillRect/>
+          </a:stretch>
+        </p:blipFill>
+        <p:spPr>
+          <a:xfrm>
+            <a:off x="0" y="4247886"/>
+            <a:ext cx="3710419" cy="1859652"/>
+          </a:xfrm>
+          <a:prstGeom prst="rect">
+            <a:avLst/>
+          </a:prstGeom>
+        </p:spPr>
+      </p:pic>
+      <p:pic>
+        <p:nvPicPr>
+          <p:cNvPr id="17" name="Picture 16">
+            <a:extLst>
+              <a:ext uri="{FF2B5EF4-FFF2-40B4-BE49-F238E27FC236}">
+                <a16:creationId xmlns:a16="http://schemas.microsoft.com/office/drawing/2014/main" id="{3B0E799E-9353-4A45-8DA6-68C78A607E3A}"/>
+              </a:ext>
+            </a:extLst>
+          </p:cNvPr>
+          <p:cNvPicPr>
+            <a:picLocks noChangeAspect="1"/>
+          </p:cNvPicPr>
+          <p:nvPr/>
+        </p:nvPicPr>
+        <p:blipFill>
+          <a:blip r:embed="rId5">
+            <a:extLst>
+              <a:ext uri="{28A0092B-C50C-407E-A947-70E740481C1C}">
+                <a14:useLocalDpi xmlns:a14="http://schemas.microsoft.com/office/drawing/2010/main" val="0"/>
+              </a:ext>
+            </a:extLst>
+          </a:blip>
+          <a:stretch>
+            <a:fillRect/>
+          </a:stretch>
+        </p:blipFill>
+        <p:spPr>
+          <a:xfrm>
+            <a:off x="3710418" y="704308"/>
+            <a:ext cx="4059947" cy="1930950"/>
+          </a:xfrm>
+          <a:prstGeom prst="rect">
+            <a:avLst/>
+          </a:prstGeom>
+        </p:spPr>
+      </p:pic>
+      <p:pic>
+        <p:nvPicPr>
+          <p:cNvPr id="19" name="Picture 18">
+            <a:extLst>
+              <a:ext uri="{FF2B5EF4-FFF2-40B4-BE49-F238E27FC236}">
+                <a16:creationId xmlns:a16="http://schemas.microsoft.com/office/drawing/2014/main" id="{52211CCD-00C5-4179-B9CE-86AA4D89D8C6}"/>
+              </a:ext>
+            </a:extLst>
+          </p:cNvPr>
+          <p:cNvPicPr>
+            <a:picLocks noChangeAspect="1"/>
+          </p:cNvPicPr>
+          <p:nvPr/>
+        </p:nvPicPr>
+        <p:blipFill>
+          <a:blip r:embed="rId6">
+            <a:extLst>
+              <a:ext uri="{28A0092B-C50C-407E-A947-70E740481C1C}">
+                <a14:useLocalDpi xmlns:a14="http://schemas.microsoft.com/office/drawing/2010/main" val="0"/>
+              </a:ext>
+            </a:extLst>
+          </a:blip>
+          <a:stretch>
+            <a:fillRect/>
+          </a:stretch>
+        </p:blipFill>
+        <p:spPr>
+          <a:xfrm>
+            <a:off x="3718842" y="2450577"/>
+            <a:ext cx="4059945" cy="1965267"/>
+          </a:xfrm>
+          <a:prstGeom prst="rect">
+            <a:avLst/>
+          </a:prstGeom>
+        </p:spPr>
+      </p:pic>
+      <p:pic>
+        <p:nvPicPr>
+          <p:cNvPr id="21" name="Picture 20">
+            <a:extLst>
+              <a:ext uri="{FF2B5EF4-FFF2-40B4-BE49-F238E27FC236}">
+                <a16:creationId xmlns:a16="http://schemas.microsoft.com/office/drawing/2014/main" id="{009BC3CE-2999-4B41-94D0-BBD5B8D80022}"/>
+              </a:ext>
+            </a:extLst>
+          </p:cNvPr>
+          <p:cNvPicPr>
+            <a:picLocks noChangeAspect="1"/>
+          </p:cNvPicPr>
+          <p:nvPr/>
+        </p:nvPicPr>
+        <p:blipFill>
+          <a:blip r:embed="rId7">
+            <a:extLst>
+              <a:ext uri="{28A0092B-C50C-407E-A947-70E740481C1C}">
+                <a14:useLocalDpi xmlns:a14="http://schemas.microsoft.com/office/drawing/2010/main" val="0"/>
+              </a:ext>
+            </a:extLst>
+          </a:blip>
+          <a:stretch>
+            <a:fillRect/>
+          </a:stretch>
+        </p:blipFill>
+        <p:spPr>
+          <a:xfrm>
+            <a:off x="3718842" y="4247886"/>
+            <a:ext cx="4051523" cy="1859652"/>
+          </a:xfrm>
+          <a:prstGeom prst="rect">
+            <a:avLst/>
+          </a:prstGeom>
+        </p:spPr>
+      </p:pic>
+      <p:sp>
+        <p:nvSpPr>
+          <p:cNvPr id="22" name="TextBox 21">
+            <a:extLst>
+              <a:ext uri="{FF2B5EF4-FFF2-40B4-BE49-F238E27FC236}">
+                <a16:creationId xmlns:a16="http://schemas.microsoft.com/office/drawing/2014/main" id="{282601D6-1103-4E70-8D72-27DBF6E3BE8A}"/>
+              </a:ext>
+            </a:extLst>
+          </p:cNvPr>
+          <p:cNvSpPr txBox="1"/>
+          <p:nvPr/>
+        </p:nvSpPr>
+        <p:spPr>
+          <a:xfrm>
+            <a:off x="5929309" y="923959"/>
+            <a:ext cx="2533790" cy="938719"/>
+          </a:xfrm>
+          <a:prstGeom prst="rect">
+            <a:avLst/>
+          </a:prstGeom>
+          <a:noFill/>
+        </p:spPr>
+        <p:txBody>
+          <a:bodyPr wrap="square" rtlCol="0">
+            <a:spAutoFit/>
+          </a:bodyPr>
+          <a:lstStyle/>
+          <a:p>
+            <a:r>
+              <a:rPr lang="en-US" sz="1100" b="1" dirty="0"/>
+              <a:t>Virus initial concentration: </a:t>
+            </a:r>
+          </a:p>
+          <a:p>
+            <a:r>
+              <a:rPr lang="en-US" sz="1100" b="1" dirty="0"/>
+              <a:t>843 copies/mL</a:t>
+            </a:r>
+          </a:p>
+          <a:p>
+            <a:r>
+              <a:rPr lang="en-US" sz="1100" b="1" dirty="0">
+                <a:solidFill>
+                  <a:srgbClr val="0000FF"/>
+                </a:solidFill>
+              </a:rPr>
+              <a:t>1685 copies/mL</a:t>
+            </a:r>
+          </a:p>
+          <a:p>
+            <a:r>
+              <a:rPr lang="en-US" sz="1100" b="1" dirty="0">
+                <a:solidFill>
+                  <a:srgbClr val="FF0000"/>
+                </a:solidFill>
+              </a:rPr>
+              <a:t>3370 copies/mL</a:t>
+            </a:r>
+          </a:p>
+          <a:p>
+            <a:r>
+              <a:rPr lang="en-US" sz="1100" b="1" dirty="0">
+                <a:solidFill>
+                  <a:srgbClr val="00B050"/>
+                </a:solidFill>
+              </a:rPr>
+              <a:t>6740 copies/mL</a:t>
+            </a:r>
+            <a:endParaRPr lang="ru-RU" sz="1100" b="1" dirty="0">
+              <a:solidFill>
+                <a:srgbClr val="00B050"/>
+              </a:solidFill>
+            </a:endParaRPr>
+          </a:p>
+        </p:txBody>
+      </p:sp>
+      <p:sp>
+        <p:nvSpPr>
+          <p:cNvPr id="23" name="TextBox 22">
+            <a:extLst>
+              <a:ext uri="{FF2B5EF4-FFF2-40B4-BE49-F238E27FC236}">
+                <a16:creationId xmlns:a16="http://schemas.microsoft.com/office/drawing/2014/main" id="{7EFCED9D-F7AC-4EB1-9530-3D6FA6F2D3A3}"/>
+              </a:ext>
+            </a:extLst>
+          </p:cNvPr>
+          <p:cNvSpPr txBox="1"/>
+          <p:nvPr/>
+        </p:nvSpPr>
+        <p:spPr>
+          <a:xfrm>
+            <a:off x="218958" y="6090772"/>
+            <a:ext cx="8706084" cy="584775"/>
+          </a:xfrm>
+          <a:prstGeom prst="rect">
+            <a:avLst/>
+          </a:prstGeom>
+          <a:noFill/>
+        </p:spPr>
+        <p:txBody>
+          <a:bodyPr wrap="square" rtlCol="0">
+            <a:spAutoFit/>
+          </a:bodyPr>
+          <a:lstStyle/>
+          <a:p>
+            <a:pPr marL="285750" indent="-285750">
+              <a:buFont typeface="Arial" panose="020B0604020202020204" pitchFamily="34" charset="0"/>
+              <a:buChar char="•"/>
+            </a:pPr>
+            <a:r>
+              <a:rPr lang="en-US" sz="1600" dirty="0"/>
+              <a:t>Total ACE2 concentration increases before day 10 if “inoculum” is above threshold</a:t>
+            </a:r>
+          </a:p>
+          <a:p>
+            <a:pPr marL="285750" indent="-285750">
+              <a:buFont typeface="Arial" panose="020B0604020202020204" pitchFamily="34" charset="0"/>
+              <a:buChar char="•"/>
+            </a:pPr>
+            <a:r>
+              <a:rPr lang="en-US" sz="1600" dirty="0"/>
+              <a:t>The increase is higher in PC than in </a:t>
+            </a:r>
+            <a:r>
+              <a:rPr lang="en-US" sz="1600" dirty="0" err="1"/>
+              <a:t>iPC</a:t>
+            </a:r>
+            <a:r>
+              <a:rPr lang="en-US" sz="1600" dirty="0"/>
+              <a:t> and </a:t>
+            </a:r>
+            <a:r>
+              <a:rPr lang="en-US" sz="1600" dirty="0" err="1"/>
+              <a:t>vPC</a:t>
+            </a:r>
+            <a:r>
+              <a:rPr lang="en-US" sz="1600" dirty="0"/>
+              <a:t> </a:t>
+            </a:r>
+          </a:p>
+        </p:txBody>
+      </p:sp>
+    </p:spTree>
+    <p:extLst>
+      <p:ext uri="{BB962C8B-B14F-4D97-AF65-F5344CB8AC3E}">
+        <p14:creationId xmlns:p14="http://schemas.microsoft.com/office/powerpoint/2010/main" val="550203502"/>
+      </p:ext>
+    </p:extLst>
+  </p:cSld>
+  <p:clrMapOvr>
+    <a:masterClrMapping/>
+  </p:clrMapOvr>
+</p:sld>
+</file>
+
+<file path=ppt/slides/slide55.xml><?xml version="1.0" encoding="utf-8"?>
+<p:sld xmlns:a="http://schemas.openxmlformats.org/drawingml/2006/main" xmlns:r="http://schemas.openxmlformats.org/officeDocument/2006/relationships" xmlns:p="http://schemas.openxmlformats.org/presentationml/2006/main">
+  <p:cSld>
+    <p:spTree>
+      <p:nvGrpSpPr>
+        <p:cNvPr id="1" name=""/>
+        <p:cNvGrpSpPr/>
+        <p:nvPr/>
+      </p:nvGrpSpPr>
+      <p:grpSpPr>
+        <a:xfrm>
+          <a:off x="0" y="0"/>
+          <a:ext cx="0" cy="0"/>
+          <a:chOff x="0" y="0"/>
+          <a:chExt cx="0" cy="0"/>
+        </a:xfrm>
+      </p:grpSpPr>
+      <p:sp>
+        <p:nvSpPr>
+          <p:cNvPr id="2" name="Title 1">
+            <a:extLst>
+              <a:ext uri="{FF2B5EF4-FFF2-40B4-BE49-F238E27FC236}">
+                <a16:creationId xmlns:a16="http://schemas.microsoft.com/office/drawing/2014/main" id="{92D571E6-D4E2-4AE3-8E98-218E5E98495D}"/>
+              </a:ext>
+            </a:extLst>
+          </p:cNvPr>
+          <p:cNvSpPr>
+            <a:spLocks noGrp="1"/>
+          </p:cNvSpPr>
+          <p:nvPr>
+            <p:ph type="title"/>
+          </p:nvPr>
+        </p:nvSpPr>
+        <p:spPr/>
+        <p:txBody>
+          <a:bodyPr/>
+          <a:lstStyle/>
+          <a:p>
+            <a:r>
+              <a:rPr lang="en-US" dirty="0"/>
+              <a:t>Virus on cell surface and inside cells</a:t>
+            </a:r>
+            <a:endParaRPr lang="ru-RU" dirty="0"/>
+          </a:p>
+        </p:txBody>
+      </p:sp>
+      <p:sp>
+        <p:nvSpPr>
+          <p:cNvPr id="3" name="Text Placeholder 2">
+            <a:extLst>
+              <a:ext uri="{FF2B5EF4-FFF2-40B4-BE49-F238E27FC236}">
+                <a16:creationId xmlns:a16="http://schemas.microsoft.com/office/drawing/2014/main" id="{5E908F9F-5181-4F24-AC97-631472E557AD}"/>
+              </a:ext>
+            </a:extLst>
+          </p:cNvPr>
+          <p:cNvSpPr>
+            <a:spLocks noGrp="1"/>
+          </p:cNvSpPr>
+          <p:nvPr>
+            <p:ph type="body" idx="1"/>
+          </p:nvPr>
+        </p:nvSpPr>
+        <p:spPr/>
+        <p:txBody>
+          <a:bodyPr/>
+          <a:lstStyle/>
+          <a:p>
+            <a:r>
+              <a:rPr lang="en-US" dirty="0"/>
+              <a:t>Diagnostic simulations of key model species and characteristics</a:t>
+            </a:r>
+            <a:endParaRPr lang="ru-RU" dirty="0"/>
+          </a:p>
+          <a:p>
+            <a:endParaRPr lang="ru-RU" dirty="0"/>
+          </a:p>
+        </p:txBody>
+      </p:sp>
+      <p:sp>
+        <p:nvSpPr>
+          <p:cNvPr id="4" name="Slide Number Placeholder 3">
+            <a:extLst>
+              <a:ext uri="{FF2B5EF4-FFF2-40B4-BE49-F238E27FC236}">
+                <a16:creationId xmlns:a16="http://schemas.microsoft.com/office/drawing/2014/main" id="{41D1849F-D011-4207-B5EE-67B6C180C3AC}"/>
+              </a:ext>
+            </a:extLst>
+          </p:cNvPr>
+          <p:cNvSpPr>
+            <a:spLocks noGrp="1"/>
+          </p:cNvSpPr>
+          <p:nvPr>
+            <p:ph type="sldNum" sz="quarter" idx="12"/>
+          </p:nvPr>
+        </p:nvSpPr>
+        <p:spPr/>
+        <p:txBody>
+          <a:bodyPr/>
+          <a:lstStyle/>
+          <a:p>
+            <a:fld id="{8D0E1ED9-1B5C-4060-9004-48CB920062D4}" type="slidenum">
+              <a:rPr lang="ru-RU" smtClean="0"/>
+              <a:pPr/>
+              <a:t>55</a:t>
+            </a:fld>
+            <a:endParaRPr lang="ru-RU"/>
+          </a:p>
+        </p:txBody>
+      </p:sp>
+    </p:spTree>
+    <p:extLst>
+      <p:ext uri="{BB962C8B-B14F-4D97-AF65-F5344CB8AC3E}">
+        <p14:creationId xmlns:p14="http://schemas.microsoft.com/office/powerpoint/2010/main" val="322393858"/>
+      </p:ext>
+    </p:extLst>
+  </p:cSld>
+  <p:clrMapOvr>
+    <a:masterClrMapping/>
+  </p:clrMapOvr>
+</p:sld>
+</file>
+
+<file path=ppt/slides/slide56.xml><?xml version="1.0" encoding="utf-8"?>
+<p:sld xmlns:a="http://schemas.openxmlformats.org/drawingml/2006/main" xmlns:r="http://schemas.openxmlformats.org/officeDocument/2006/relationships" xmlns:p="http://schemas.openxmlformats.org/presentationml/2006/main">
+  <p:cSld>
+    <p:spTree>
+      <p:nvGrpSpPr>
+        <p:cNvPr id="1" name=""/>
+        <p:cNvGrpSpPr/>
+        <p:nvPr/>
+      </p:nvGrpSpPr>
+      <p:grpSpPr>
+        <a:xfrm>
+          <a:off x="0" y="0"/>
+          <a:ext cx="0" cy="0"/>
+          <a:chOff x="0" y="0"/>
+          <a:chExt cx="0" cy="0"/>
+        </a:xfrm>
+      </p:grpSpPr>
+      <p:sp>
+        <p:nvSpPr>
+          <p:cNvPr id="2" name="Заголовок 1"/>
+          <p:cNvSpPr>
+            <a:spLocks noGrp="1"/>
+          </p:cNvSpPr>
+          <p:nvPr>
+            <p:ph type="title"/>
+          </p:nvPr>
+        </p:nvSpPr>
+        <p:spPr/>
+        <p:txBody>
+          <a:bodyPr/>
+          <a:lstStyle/>
+          <a:p>
+            <a:r>
+              <a:rPr lang="en-US" dirty="0"/>
+              <a:t>Simulations: total COV on/inside of PC states</a:t>
+            </a:r>
+            <a:endParaRPr lang="ru-RU" dirty="0"/>
+          </a:p>
+        </p:txBody>
+      </p:sp>
+      <p:sp>
+        <p:nvSpPr>
+          <p:cNvPr id="3" name="Номер слайда 2"/>
+          <p:cNvSpPr>
+            <a:spLocks noGrp="1"/>
+          </p:cNvSpPr>
+          <p:nvPr>
+            <p:ph type="sldNum" sz="quarter" idx="12"/>
+          </p:nvPr>
+        </p:nvSpPr>
+        <p:spPr/>
+        <p:txBody>
+          <a:bodyPr/>
+          <a:lstStyle/>
+          <a:p>
+            <a:fld id="{8D0E1ED9-1B5C-4060-9004-48CB920062D4}" type="slidenum">
+              <a:rPr lang="ru-RU" smtClean="0"/>
+              <a:pPr/>
+              <a:t>56</a:t>
+            </a:fld>
+            <a:endParaRPr lang="ru-RU"/>
+          </a:p>
+        </p:txBody>
+      </p:sp>
+      <p:pic>
+        <p:nvPicPr>
+          <p:cNvPr id="5" name="Picture 4">
+            <a:extLst>
+              <a:ext uri="{FF2B5EF4-FFF2-40B4-BE49-F238E27FC236}">
+                <a16:creationId xmlns:a16="http://schemas.microsoft.com/office/drawing/2014/main" id="{2E9AC1A1-B0DA-4C9E-8CF0-72CB3CB6383B}"/>
+              </a:ext>
+            </a:extLst>
+          </p:cNvPr>
+          <p:cNvPicPr>
+            <a:picLocks noChangeAspect="1"/>
+          </p:cNvPicPr>
+          <p:nvPr/>
+        </p:nvPicPr>
+        <p:blipFill>
+          <a:blip r:embed="rId2">
+            <a:extLst>
+              <a:ext uri="{28A0092B-C50C-407E-A947-70E740481C1C}">
+                <a14:useLocalDpi xmlns:a14="http://schemas.microsoft.com/office/drawing/2010/main" val="0"/>
+              </a:ext>
+            </a:extLst>
+          </a:blip>
+          <a:stretch>
+            <a:fillRect/>
+          </a:stretch>
+        </p:blipFill>
+        <p:spPr>
+          <a:xfrm>
+            <a:off x="0" y="741203"/>
+            <a:ext cx="4572000" cy="2174488"/>
+          </a:xfrm>
+          <a:prstGeom prst="rect">
+            <a:avLst/>
+          </a:prstGeom>
+        </p:spPr>
+      </p:pic>
+      <p:pic>
+        <p:nvPicPr>
+          <p:cNvPr id="8" name="Picture 7">
+            <a:extLst>
+              <a:ext uri="{FF2B5EF4-FFF2-40B4-BE49-F238E27FC236}">
+                <a16:creationId xmlns:a16="http://schemas.microsoft.com/office/drawing/2014/main" id="{CB13DF2C-77AC-4195-B902-25B61322070F}"/>
+              </a:ext>
+            </a:extLst>
+          </p:cNvPr>
+          <p:cNvPicPr>
+            <a:picLocks noChangeAspect="1"/>
+          </p:cNvPicPr>
+          <p:nvPr/>
+        </p:nvPicPr>
+        <p:blipFill>
+          <a:blip r:embed="rId3">
+            <a:extLst>
+              <a:ext uri="{28A0092B-C50C-407E-A947-70E740481C1C}">
+                <a14:useLocalDpi xmlns:a14="http://schemas.microsoft.com/office/drawing/2010/main" val="0"/>
+              </a:ext>
+            </a:extLst>
+          </a:blip>
+          <a:stretch>
+            <a:fillRect/>
+          </a:stretch>
+        </p:blipFill>
+        <p:spPr>
+          <a:xfrm>
+            <a:off x="4572000" y="741204"/>
+            <a:ext cx="4572000" cy="2174488"/>
+          </a:xfrm>
+          <a:prstGeom prst="rect">
+            <a:avLst/>
+          </a:prstGeom>
+        </p:spPr>
+      </p:pic>
+      <p:pic>
+        <p:nvPicPr>
+          <p:cNvPr id="12" name="Picture 11">
+            <a:extLst>
+              <a:ext uri="{FF2B5EF4-FFF2-40B4-BE49-F238E27FC236}">
+                <a16:creationId xmlns:a16="http://schemas.microsoft.com/office/drawing/2014/main" id="{83BEA6F3-41A7-4AAA-915C-69BB211FCCD8}"/>
+              </a:ext>
+            </a:extLst>
+          </p:cNvPr>
+          <p:cNvPicPr>
+            <a:picLocks noChangeAspect="1"/>
+          </p:cNvPicPr>
+          <p:nvPr/>
+        </p:nvPicPr>
+        <p:blipFill>
+          <a:blip r:embed="rId4">
+            <a:extLst>
+              <a:ext uri="{28A0092B-C50C-407E-A947-70E740481C1C}">
+                <a14:useLocalDpi xmlns:a14="http://schemas.microsoft.com/office/drawing/2010/main" val="0"/>
+              </a:ext>
+            </a:extLst>
+          </a:blip>
+          <a:stretch>
+            <a:fillRect/>
+          </a:stretch>
+        </p:blipFill>
+        <p:spPr>
+          <a:xfrm>
+            <a:off x="0" y="3065449"/>
+            <a:ext cx="4572000" cy="2174488"/>
+          </a:xfrm>
+          <a:prstGeom prst="rect">
+            <a:avLst/>
+          </a:prstGeom>
+        </p:spPr>
+      </p:pic>
+      <p:sp>
+        <p:nvSpPr>
+          <p:cNvPr id="16" name="TextBox 15">
+            <a:extLst>
+              <a:ext uri="{FF2B5EF4-FFF2-40B4-BE49-F238E27FC236}">
+                <a16:creationId xmlns:a16="http://schemas.microsoft.com/office/drawing/2014/main" id="{3DD0FA05-890F-4FCF-8E6A-C13D3F4BABCA}"/>
+              </a:ext>
+            </a:extLst>
+          </p:cNvPr>
+          <p:cNvSpPr txBox="1"/>
+          <p:nvPr/>
+        </p:nvSpPr>
+        <p:spPr>
+          <a:xfrm>
+            <a:off x="554644" y="951973"/>
+            <a:ext cx="2533790" cy="938719"/>
+          </a:xfrm>
+          <a:prstGeom prst="rect">
+            <a:avLst/>
+          </a:prstGeom>
+          <a:noFill/>
+        </p:spPr>
+        <p:txBody>
+          <a:bodyPr wrap="square" rtlCol="0">
+            <a:spAutoFit/>
+          </a:bodyPr>
+          <a:lstStyle/>
+          <a:p>
+            <a:r>
+              <a:rPr lang="en-US" sz="1100" b="1" dirty="0"/>
+              <a:t>Virus initial concentration: </a:t>
+            </a:r>
+          </a:p>
+          <a:p>
+            <a:r>
+              <a:rPr lang="en-US" sz="1100" b="1" dirty="0"/>
+              <a:t>843 copies/mL</a:t>
+            </a:r>
+          </a:p>
+          <a:p>
+            <a:r>
+              <a:rPr lang="en-US" sz="1100" b="1" dirty="0">
+                <a:solidFill>
+                  <a:srgbClr val="0000FF"/>
+                </a:solidFill>
+              </a:rPr>
+              <a:t>1685 copies/mL</a:t>
+            </a:r>
+          </a:p>
+          <a:p>
+            <a:r>
+              <a:rPr lang="en-US" sz="1100" b="1" dirty="0">
+                <a:solidFill>
+                  <a:srgbClr val="FF0000"/>
+                </a:solidFill>
+              </a:rPr>
+              <a:t>3370 copies/mL</a:t>
+            </a:r>
+          </a:p>
+          <a:p>
+            <a:r>
+              <a:rPr lang="en-US" sz="1100" b="1" dirty="0">
+                <a:solidFill>
+                  <a:srgbClr val="00B050"/>
+                </a:solidFill>
+              </a:rPr>
+              <a:t>6740 copies/mL</a:t>
+            </a:r>
+            <a:endParaRPr lang="ru-RU" sz="1100" b="1" dirty="0">
+              <a:solidFill>
+                <a:srgbClr val="00B050"/>
+              </a:solidFill>
+            </a:endParaRPr>
+          </a:p>
+        </p:txBody>
+      </p:sp>
+    </p:spTree>
+    <p:extLst>
+      <p:ext uri="{BB962C8B-B14F-4D97-AF65-F5344CB8AC3E}">
+        <p14:creationId xmlns:p14="http://schemas.microsoft.com/office/powerpoint/2010/main" val="1056788453"/>
+      </p:ext>
+    </p:extLst>
+  </p:cSld>
+  <p:clrMapOvr>
+    <a:masterClrMapping/>
+  </p:clrMapOvr>
+</p:sld>
+</file>
+
+<file path=ppt/slides/slide57.xml><?xml version="1.0" encoding="utf-8"?>
+<p:sld xmlns:a="http://schemas.openxmlformats.org/drawingml/2006/main" xmlns:r="http://schemas.openxmlformats.org/officeDocument/2006/relationships" xmlns:p="http://schemas.openxmlformats.org/presentationml/2006/main">
+  <p:cSld>
+    <p:spTree>
+      <p:nvGrpSpPr>
+        <p:cNvPr id="1" name=""/>
+        <p:cNvGrpSpPr/>
+        <p:nvPr/>
+      </p:nvGrpSpPr>
+      <p:grpSpPr>
+        <a:xfrm>
+          <a:off x="0" y="0"/>
+          <a:ext cx="0" cy="0"/>
+          <a:chOff x="0" y="0"/>
+          <a:chExt cx="0" cy="0"/>
+        </a:xfrm>
+      </p:grpSpPr>
+      <p:sp>
+        <p:nvSpPr>
+          <p:cNvPr id="2" name="Заголовок 1"/>
+          <p:cNvSpPr>
+            <a:spLocks noGrp="1"/>
+          </p:cNvSpPr>
+          <p:nvPr>
+            <p:ph type="title"/>
+          </p:nvPr>
+        </p:nvSpPr>
+        <p:spPr/>
+        <p:txBody>
+          <a:bodyPr/>
+          <a:lstStyle/>
+          <a:p>
+            <a:r>
+              <a:rPr lang="en-US" dirty="0"/>
+              <a:t>Simulations: COV on/inside of </a:t>
+            </a:r>
+            <a:r>
+              <a:rPr lang="en-US" dirty="0" err="1"/>
+              <a:t>iPC</a:t>
+            </a:r>
+            <a:endParaRPr lang="ru-RU" dirty="0"/>
+          </a:p>
+        </p:txBody>
+      </p:sp>
+      <p:sp>
+        <p:nvSpPr>
+          <p:cNvPr id="3" name="Номер слайда 2"/>
+          <p:cNvSpPr>
+            <a:spLocks noGrp="1"/>
+          </p:cNvSpPr>
+          <p:nvPr>
+            <p:ph type="sldNum" sz="quarter" idx="12"/>
+          </p:nvPr>
+        </p:nvSpPr>
+        <p:spPr/>
+        <p:txBody>
+          <a:bodyPr/>
+          <a:lstStyle/>
+          <a:p>
+            <a:fld id="{8D0E1ED9-1B5C-4060-9004-48CB920062D4}" type="slidenum">
+              <a:rPr lang="ru-RU" smtClean="0"/>
+              <a:pPr/>
+              <a:t>57</a:t>
+            </a:fld>
+            <a:endParaRPr lang="ru-RU"/>
+          </a:p>
+        </p:txBody>
+      </p:sp>
+      <p:pic>
+        <p:nvPicPr>
+          <p:cNvPr id="6" name="Picture 5">
+            <a:extLst>
+              <a:ext uri="{FF2B5EF4-FFF2-40B4-BE49-F238E27FC236}">
+                <a16:creationId xmlns:a16="http://schemas.microsoft.com/office/drawing/2014/main" id="{B79E15B6-F52A-4FF6-BF71-53F6B2E95834}"/>
+              </a:ext>
+            </a:extLst>
+          </p:cNvPr>
+          <p:cNvPicPr>
+            <a:picLocks noChangeAspect="1"/>
+          </p:cNvPicPr>
+          <p:nvPr/>
+        </p:nvPicPr>
+        <p:blipFill>
+          <a:blip r:embed="rId2">
+            <a:extLst>
+              <a:ext uri="{28A0092B-C50C-407E-A947-70E740481C1C}">
+                <a14:useLocalDpi xmlns:a14="http://schemas.microsoft.com/office/drawing/2010/main" val="0"/>
+              </a:ext>
+            </a:extLst>
+          </a:blip>
+          <a:stretch>
+            <a:fillRect/>
+          </a:stretch>
+        </p:blipFill>
+        <p:spPr>
+          <a:xfrm>
+            <a:off x="0" y="713208"/>
+            <a:ext cx="5775649" cy="2746955"/>
+          </a:xfrm>
+          <a:prstGeom prst="rect">
+            <a:avLst/>
+          </a:prstGeom>
+        </p:spPr>
+      </p:pic>
+      <p:pic>
+        <p:nvPicPr>
+          <p:cNvPr id="9" name="Picture 8">
+            <a:extLst>
+              <a:ext uri="{FF2B5EF4-FFF2-40B4-BE49-F238E27FC236}">
+                <a16:creationId xmlns:a16="http://schemas.microsoft.com/office/drawing/2014/main" id="{2A82B999-5FE0-40D5-A163-0229CE20E7B7}"/>
+              </a:ext>
+            </a:extLst>
+          </p:cNvPr>
+          <p:cNvPicPr>
+            <a:picLocks noChangeAspect="1"/>
+          </p:cNvPicPr>
+          <p:nvPr/>
+        </p:nvPicPr>
+        <p:blipFill>
+          <a:blip r:embed="rId3">
+            <a:extLst>
+              <a:ext uri="{28A0092B-C50C-407E-A947-70E740481C1C}">
+                <a14:useLocalDpi xmlns:a14="http://schemas.microsoft.com/office/drawing/2010/main" val="0"/>
+              </a:ext>
+            </a:extLst>
+          </a:blip>
+          <a:stretch>
+            <a:fillRect/>
+          </a:stretch>
+        </p:blipFill>
+        <p:spPr>
+          <a:xfrm>
+            <a:off x="0" y="3460163"/>
+            <a:ext cx="5775649" cy="2746955"/>
+          </a:xfrm>
+          <a:prstGeom prst="rect">
+            <a:avLst/>
+          </a:prstGeom>
+        </p:spPr>
+      </p:pic>
+      <p:sp>
+        <p:nvSpPr>
+          <p:cNvPr id="15" name="TextBox 14">
+            <a:extLst>
+              <a:ext uri="{FF2B5EF4-FFF2-40B4-BE49-F238E27FC236}">
+                <a16:creationId xmlns:a16="http://schemas.microsoft.com/office/drawing/2014/main" id="{02EFE39A-B41B-41BE-B214-728FD3731739}"/>
+              </a:ext>
+            </a:extLst>
+          </p:cNvPr>
+          <p:cNvSpPr txBox="1"/>
+          <p:nvPr/>
+        </p:nvSpPr>
+        <p:spPr>
+          <a:xfrm>
+            <a:off x="778576" y="998756"/>
+            <a:ext cx="2533790" cy="938719"/>
+          </a:xfrm>
+          <a:prstGeom prst="rect">
+            <a:avLst/>
+          </a:prstGeom>
+          <a:noFill/>
+        </p:spPr>
+        <p:txBody>
+          <a:bodyPr wrap="square" rtlCol="0">
+            <a:spAutoFit/>
+          </a:bodyPr>
+          <a:lstStyle/>
+          <a:p>
+            <a:r>
+              <a:rPr lang="en-US" sz="1100" b="1" dirty="0"/>
+              <a:t>Virus initial concentration: </a:t>
+            </a:r>
+          </a:p>
+          <a:p>
+            <a:r>
+              <a:rPr lang="en-US" sz="1100" b="1" dirty="0"/>
+              <a:t>843 copies/mL</a:t>
+            </a:r>
+          </a:p>
+          <a:p>
+            <a:r>
+              <a:rPr lang="en-US" sz="1100" b="1" dirty="0">
+                <a:solidFill>
+                  <a:srgbClr val="0000FF"/>
+                </a:solidFill>
+              </a:rPr>
+              <a:t>1685 copies/mL</a:t>
+            </a:r>
+          </a:p>
+          <a:p>
+            <a:r>
+              <a:rPr lang="en-US" sz="1100" b="1" dirty="0">
+                <a:solidFill>
+                  <a:srgbClr val="FF0000"/>
+                </a:solidFill>
+              </a:rPr>
+              <a:t>3370 copies/mL</a:t>
+            </a:r>
+          </a:p>
+          <a:p>
+            <a:r>
+              <a:rPr lang="en-US" sz="1100" b="1" dirty="0">
+                <a:solidFill>
+                  <a:srgbClr val="00B050"/>
+                </a:solidFill>
+              </a:rPr>
+              <a:t>6740 copies/mL</a:t>
+            </a:r>
+            <a:endParaRPr lang="ru-RU" sz="1100" b="1" dirty="0">
+              <a:solidFill>
+                <a:srgbClr val="00B050"/>
+              </a:solidFill>
+            </a:endParaRPr>
+          </a:p>
+        </p:txBody>
+      </p:sp>
+    </p:spTree>
+    <p:extLst>
+      <p:ext uri="{BB962C8B-B14F-4D97-AF65-F5344CB8AC3E}">
+        <p14:creationId xmlns:p14="http://schemas.microsoft.com/office/powerpoint/2010/main" val="2399174073"/>
+      </p:ext>
+    </p:extLst>
+  </p:cSld>
+  <p:clrMapOvr>
+    <a:masterClrMapping/>
+  </p:clrMapOvr>
+</p:sld>
+</file>
+
+<file path=ppt/slides/slide58.xml><?xml version="1.0" encoding="utf-8"?>
+<p:sld xmlns:a="http://schemas.openxmlformats.org/drawingml/2006/main" xmlns:r="http://schemas.openxmlformats.org/officeDocument/2006/relationships" xmlns:p="http://schemas.openxmlformats.org/presentationml/2006/main">
+  <p:cSld>
+    <p:spTree>
+      <p:nvGrpSpPr>
+        <p:cNvPr id="1" name=""/>
+        <p:cNvGrpSpPr/>
+        <p:nvPr/>
+      </p:nvGrpSpPr>
+      <p:grpSpPr>
+        <a:xfrm>
+          <a:off x="0" y="0"/>
+          <a:ext cx="0" cy="0"/>
+          <a:chOff x="0" y="0"/>
+          <a:chExt cx="0" cy="0"/>
+        </a:xfrm>
+      </p:grpSpPr>
+      <p:sp>
+        <p:nvSpPr>
+          <p:cNvPr id="2" name="Заголовок 1"/>
+          <p:cNvSpPr>
+            <a:spLocks noGrp="1"/>
+          </p:cNvSpPr>
+          <p:nvPr>
+            <p:ph type="title"/>
+          </p:nvPr>
+        </p:nvSpPr>
+        <p:spPr/>
+        <p:txBody>
+          <a:bodyPr/>
+          <a:lstStyle/>
+          <a:p>
+            <a:r>
+              <a:rPr lang="en-US" dirty="0"/>
+              <a:t>Simulations: COV on/inside of </a:t>
+            </a:r>
+            <a:r>
+              <a:rPr lang="en-US" dirty="0" err="1"/>
+              <a:t>vPC</a:t>
+            </a:r>
+            <a:endParaRPr lang="ru-RU" dirty="0"/>
+          </a:p>
+        </p:txBody>
+      </p:sp>
+      <p:sp>
+        <p:nvSpPr>
+          <p:cNvPr id="3" name="Номер слайда 2"/>
+          <p:cNvSpPr>
+            <a:spLocks noGrp="1"/>
+          </p:cNvSpPr>
+          <p:nvPr>
+            <p:ph type="sldNum" sz="quarter" idx="12"/>
+          </p:nvPr>
+        </p:nvSpPr>
+        <p:spPr/>
+        <p:txBody>
+          <a:bodyPr/>
+          <a:lstStyle/>
+          <a:p>
+            <a:fld id="{8D0E1ED9-1B5C-4060-9004-48CB920062D4}" type="slidenum">
+              <a:rPr lang="ru-RU" smtClean="0"/>
+              <a:pPr/>
+              <a:t>58</a:t>
+            </a:fld>
+            <a:endParaRPr lang="ru-RU"/>
+          </a:p>
+        </p:txBody>
+      </p:sp>
+      <p:pic>
+        <p:nvPicPr>
+          <p:cNvPr id="6" name="Picture 5">
+            <a:extLst>
+              <a:ext uri="{FF2B5EF4-FFF2-40B4-BE49-F238E27FC236}">
+                <a16:creationId xmlns:a16="http://schemas.microsoft.com/office/drawing/2014/main" id="{E6306B3D-6805-4398-817E-15BD76D1FCFA}"/>
+              </a:ext>
+            </a:extLst>
+          </p:cNvPr>
+          <p:cNvPicPr>
+            <a:picLocks noChangeAspect="1"/>
+          </p:cNvPicPr>
+          <p:nvPr/>
+        </p:nvPicPr>
+        <p:blipFill>
+          <a:blip r:embed="rId2">
+            <a:extLst>
+              <a:ext uri="{28A0092B-C50C-407E-A947-70E740481C1C}">
+                <a14:useLocalDpi xmlns:a14="http://schemas.microsoft.com/office/drawing/2010/main" val="0"/>
+              </a:ext>
+            </a:extLst>
+          </a:blip>
+          <a:stretch>
+            <a:fillRect/>
+          </a:stretch>
+        </p:blipFill>
+        <p:spPr>
+          <a:xfrm>
+            <a:off x="0" y="713208"/>
+            <a:ext cx="4572000" cy="2174488"/>
+          </a:xfrm>
+          <a:prstGeom prst="rect">
+            <a:avLst/>
+          </a:prstGeom>
+        </p:spPr>
+      </p:pic>
+      <p:pic>
+        <p:nvPicPr>
+          <p:cNvPr id="9" name="Picture 8">
+            <a:extLst>
+              <a:ext uri="{FF2B5EF4-FFF2-40B4-BE49-F238E27FC236}">
+                <a16:creationId xmlns:a16="http://schemas.microsoft.com/office/drawing/2014/main" id="{64E206C2-E079-49B3-ACAE-9A4C79F208E4}"/>
+              </a:ext>
+            </a:extLst>
+          </p:cNvPr>
+          <p:cNvPicPr>
+            <a:picLocks noChangeAspect="1"/>
+          </p:cNvPicPr>
+          <p:nvPr/>
+        </p:nvPicPr>
+        <p:blipFill>
+          <a:blip r:embed="rId3">
+            <a:extLst>
+              <a:ext uri="{28A0092B-C50C-407E-A947-70E740481C1C}">
+                <a14:useLocalDpi xmlns:a14="http://schemas.microsoft.com/office/drawing/2010/main" val="0"/>
+              </a:ext>
+            </a:extLst>
+          </a:blip>
+          <a:stretch>
+            <a:fillRect/>
+          </a:stretch>
+        </p:blipFill>
+        <p:spPr>
+          <a:xfrm>
+            <a:off x="4572000" y="713208"/>
+            <a:ext cx="4572000" cy="2174488"/>
+          </a:xfrm>
+          <a:prstGeom prst="rect">
+            <a:avLst/>
+          </a:prstGeom>
+        </p:spPr>
+      </p:pic>
+      <p:pic>
+        <p:nvPicPr>
+          <p:cNvPr id="15" name="Picture 14">
+            <a:extLst>
+              <a:ext uri="{FF2B5EF4-FFF2-40B4-BE49-F238E27FC236}">
+                <a16:creationId xmlns:a16="http://schemas.microsoft.com/office/drawing/2014/main" id="{C15CA0EA-5EEB-4F02-98D2-6E4B14B70BDF}"/>
+              </a:ext>
+            </a:extLst>
+          </p:cNvPr>
+          <p:cNvPicPr>
+            <a:picLocks noChangeAspect="1"/>
+          </p:cNvPicPr>
+          <p:nvPr/>
+        </p:nvPicPr>
+        <p:blipFill>
+          <a:blip r:embed="rId4">
+            <a:extLst>
+              <a:ext uri="{28A0092B-C50C-407E-A947-70E740481C1C}">
+                <a14:useLocalDpi xmlns:a14="http://schemas.microsoft.com/office/drawing/2010/main" val="0"/>
+              </a:ext>
+            </a:extLst>
+          </a:blip>
+          <a:stretch>
+            <a:fillRect/>
+          </a:stretch>
+        </p:blipFill>
+        <p:spPr>
+          <a:xfrm>
+            <a:off x="0" y="2887696"/>
+            <a:ext cx="4572000" cy="2174488"/>
+          </a:xfrm>
+          <a:prstGeom prst="rect">
+            <a:avLst/>
+          </a:prstGeom>
+        </p:spPr>
+      </p:pic>
+      <p:pic>
+        <p:nvPicPr>
+          <p:cNvPr id="17" name="Picture 16">
+            <a:extLst>
+              <a:ext uri="{FF2B5EF4-FFF2-40B4-BE49-F238E27FC236}">
+                <a16:creationId xmlns:a16="http://schemas.microsoft.com/office/drawing/2014/main" id="{5EA3CA3B-7C51-40C5-95E0-B032C569D1DF}"/>
+              </a:ext>
+            </a:extLst>
+          </p:cNvPr>
+          <p:cNvPicPr>
+            <a:picLocks noChangeAspect="1"/>
+          </p:cNvPicPr>
+          <p:nvPr/>
+        </p:nvPicPr>
+        <p:blipFill>
+          <a:blip r:embed="rId5">
+            <a:extLst>
+              <a:ext uri="{28A0092B-C50C-407E-A947-70E740481C1C}">
+                <a14:useLocalDpi xmlns:a14="http://schemas.microsoft.com/office/drawing/2010/main" val="0"/>
+              </a:ext>
+            </a:extLst>
+          </a:blip>
+          <a:stretch>
+            <a:fillRect/>
+          </a:stretch>
+        </p:blipFill>
+        <p:spPr>
+          <a:xfrm>
+            <a:off x="4572000" y="2887696"/>
+            <a:ext cx="4572000" cy="2174488"/>
+          </a:xfrm>
+          <a:prstGeom prst="rect">
+            <a:avLst/>
+          </a:prstGeom>
+        </p:spPr>
+      </p:pic>
+      <p:sp>
+        <p:nvSpPr>
+          <p:cNvPr id="18" name="TextBox 17">
+            <a:extLst>
+              <a:ext uri="{FF2B5EF4-FFF2-40B4-BE49-F238E27FC236}">
+                <a16:creationId xmlns:a16="http://schemas.microsoft.com/office/drawing/2014/main" id="{FE41E053-4770-4E06-8319-01B83CDD6935}"/>
+              </a:ext>
+            </a:extLst>
+          </p:cNvPr>
+          <p:cNvSpPr txBox="1"/>
+          <p:nvPr/>
+        </p:nvSpPr>
+        <p:spPr>
+          <a:xfrm>
+            <a:off x="535982" y="877459"/>
+            <a:ext cx="2533790" cy="938719"/>
+          </a:xfrm>
+          <a:prstGeom prst="rect">
+            <a:avLst/>
+          </a:prstGeom>
+          <a:noFill/>
+        </p:spPr>
+        <p:txBody>
+          <a:bodyPr wrap="square" rtlCol="0">
+            <a:spAutoFit/>
+          </a:bodyPr>
+          <a:lstStyle/>
+          <a:p>
+            <a:r>
+              <a:rPr lang="en-US" sz="1100" b="1" dirty="0"/>
+              <a:t>Virus initial concentration: </a:t>
+            </a:r>
+          </a:p>
+          <a:p>
+            <a:r>
+              <a:rPr lang="en-US" sz="1100" b="1" dirty="0"/>
+              <a:t>843 copies/mL</a:t>
+            </a:r>
+          </a:p>
+          <a:p>
+            <a:r>
+              <a:rPr lang="en-US" sz="1100" b="1" dirty="0">
+                <a:solidFill>
+                  <a:srgbClr val="0000FF"/>
+                </a:solidFill>
+              </a:rPr>
+              <a:t>1685 copies/mL</a:t>
+            </a:r>
+          </a:p>
+          <a:p>
+            <a:r>
+              <a:rPr lang="en-US" sz="1100" b="1" dirty="0">
+                <a:solidFill>
+                  <a:srgbClr val="FF0000"/>
+                </a:solidFill>
+              </a:rPr>
+              <a:t>3370 copies/mL</a:t>
+            </a:r>
+          </a:p>
+          <a:p>
+            <a:r>
+              <a:rPr lang="en-US" sz="1100" b="1" dirty="0">
+                <a:solidFill>
+                  <a:srgbClr val="00B050"/>
+                </a:solidFill>
+              </a:rPr>
+              <a:t>6740 copies/mL</a:t>
+            </a:r>
+            <a:endParaRPr lang="ru-RU" sz="1100" b="1" dirty="0">
+              <a:solidFill>
+                <a:srgbClr val="00B050"/>
+              </a:solidFill>
+            </a:endParaRPr>
+          </a:p>
+        </p:txBody>
+      </p:sp>
+    </p:spTree>
+    <p:extLst>
+      <p:ext uri="{BB962C8B-B14F-4D97-AF65-F5344CB8AC3E}">
+        <p14:creationId xmlns:p14="http://schemas.microsoft.com/office/powerpoint/2010/main" val="313787512"/>
+      </p:ext>
+    </p:extLst>
+  </p:cSld>
+  <p:clrMapOvr>
+    <a:masterClrMapping/>
+  </p:clrMapOvr>
+</p:sld>
+</file>
+
+<file path=ppt/slides/slide59.xml><?xml version="1.0" encoding="utf-8"?>
+<p:sld xmlns:a="http://schemas.openxmlformats.org/drawingml/2006/main" xmlns:r="http://schemas.openxmlformats.org/officeDocument/2006/relationships" xmlns:p="http://schemas.openxmlformats.org/presentationml/2006/main">
+  <p:cSld>
+    <p:spTree>
+      <p:nvGrpSpPr>
+        <p:cNvPr id="1" name=""/>
+        <p:cNvGrpSpPr/>
+        <p:nvPr/>
+      </p:nvGrpSpPr>
+      <p:grpSpPr>
+        <a:xfrm>
+          <a:off x="0" y="0"/>
+          <a:ext cx="0" cy="0"/>
+          <a:chOff x="0" y="0"/>
+          <a:chExt cx="0" cy="0"/>
+        </a:xfrm>
+      </p:grpSpPr>
+      <p:sp>
+        <p:nvSpPr>
+          <p:cNvPr id="2" name="Slide Number Placeholder 1">
+            <a:extLst>
+              <a:ext uri="{FF2B5EF4-FFF2-40B4-BE49-F238E27FC236}">
+                <a16:creationId xmlns:a16="http://schemas.microsoft.com/office/drawing/2014/main" id="{AA6CEFC3-35E4-46AB-8178-6CE9EA81C1D9}"/>
+              </a:ext>
+            </a:extLst>
+          </p:cNvPr>
+          <p:cNvSpPr>
+            <a:spLocks noGrp="1"/>
+          </p:cNvSpPr>
+          <p:nvPr>
+            <p:ph type="sldNum" sz="quarter" idx="12"/>
+          </p:nvPr>
+        </p:nvSpPr>
+        <p:spPr/>
+        <p:txBody>
+          <a:bodyPr/>
+          <a:lstStyle/>
+          <a:p>
+            <a:fld id="{8D0E1ED9-1B5C-4060-9004-48CB920062D4}" type="slidenum">
+              <a:rPr lang="ru-RU" smtClean="0"/>
+              <a:pPr/>
+              <a:t>59</a:t>
+            </a:fld>
+            <a:endParaRPr lang="ru-RU"/>
+          </a:p>
+        </p:txBody>
+      </p:sp>
+    </p:spTree>
+    <p:extLst>
+      <p:ext uri="{BB962C8B-B14F-4D97-AF65-F5344CB8AC3E}">
+        <p14:creationId xmlns:p14="http://schemas.microsoft.com/office/powerpoint/2010/main" val="587504139"/>
       </p:ext>
     </p:extLst>
   </p:cSld>

</xml_diff>